<commit_message>
Updated PPT with informal results to reproduce Sutton plots and showing MC convergence
</commit_message>
<xml_diff>
--- a/RL-001-MemoryManagement/results/202004Apr17-TestsTDLambdaMCLamba-1DGridworld.pptx
+++ b/RL-001-MemoryManagement/results/202004Apr17-TestsTDLambdaMCLamba-1DGridworld.pptx
@@ -11,16 +11,21 @@
     <p:sldId id="260" r:id="rId5"/>
     <p:sldId id="261" r:id="rId6"/>
     <p:sldId id="265" r:id="rId7"/>
-    <p:sldId id="258" r:id="rId8"/>
-    <p:sldId id="257" r:id="rId9"/>
-    <p:sldId id="267" r:id="rId10"/>
-    <p:sldId id="262" r:id="rId11"/>
-    <p:sldId id="263" r:id="rId12"/>
-    <p:sldId id="266" r:id="rId13"/>
-    <p:sldId id="268" r:id="rId14"/>
-    <p:sldId id="269" r:id="rId15"/>
-    <p:sldId id="270" r:id="rId16"/>
-    <p:sldId id="271" r:id="rId17"/>
+    <p:sldId id="272" r:id="rId8"/>
+    <p:sldId id="258" r:id="rId9"/>
+    <p:sldId id="257" r:id="rId10"/>
+    <p:sldId id="267" r:id="rId11"/>
+    <p:sldId id="273" r:id="rId12"/>
+    <p:sldId id="274" r:id="rId13"/>
+    <p:sldId id="262" r:id="rId14"/>
+    <p:sldId id="263" r:id="rId15"/>
+    <p:sldId id="266" r:id="rId16"/>
+    <p:sldId id="268" r:id="rId17"/>
+    <p:sldId id="269" r:id="rId18"/>
+    <p:sldId id="270" r:id="rId19"/>
+    <p:sldId id="271" r:id="rId20"/>
+    <p:sldId id="275" r:id="rId21"/>
+    <p:sldId id="276" r:id="rId22"/>
   </p:sldIdLst>
   <p:sldSz cx="9144000" cy="6858000" type="screen4x3"/>
   <p:notesSz cx="6858000" cy="9144000"/>
@@ -303,7 +308,7 @@
           <a:p>
             <a:fld id="{6F146A8E-1171-4935-B627-E6ABE4D502B8}" type="datetimeFigureOut">
               <a:rPr lang="en-US" smtClean="0"/>
-              <a:t>4/17/2020</a:t>
+              <a:t>5/12/2020</a:t>
             </a:fld>
             <a:endParaRPr lang="en-US"/>
           </a:p>
@@ -473,7 +478,7 @@
           <a:p>
             <a:fld id="{6F146A8E-1171-4935-B627-E6ABE4D502B8}" type="datetimeFigureOut">
               <a:rPr lang="en-US" smtClean="0"/>
-              <a:t>4/17/2020</a:t>
+              <a:t>5/12/2020</a:t>
             </a:fld>
             <a:endParaRPr lang="en-US"/>
           </a:p>
@@ -653,7 +658,7 @@
           <a:p>
             <a:fld id="{6F146A8E-1171-4935-B627-E6ABE4D502B8}" type="datetimeFigureOut">
               <a:rPr lang="en-US" smtClean="0"/>
-              <a:t>4/17/2020</a:t>
+              <a:t>5/12/2020</a:t>
             </a:fld>
             <a:endParaRPr lang="en-US"/>
           </a:p>
@@ -823,7 +828,7 @@
           <a:p>
             <a:fld id="{6F146A8E-1171-4935-B627-E6ABE4D502B8}" type="datetimeFigureOut">
               <a:rPr lang="en-US" smtClean="0"/>
-              <a:t>4/17/2020</a:t>
+              <a:t>5/12/2020</a:t>
             </a:fld>
             <a:endParaRPr lang="en-US"/>
           </a:p>
@@ -1069,7 +1074,7 @@
           <a:p>
             <a:fld id="{6F146A8E-1171-4935-B627-E6ABE4D502B8}" type="datetimeFigureOut">
               <a:rPr lang="en-US" smtClean="0"/>
-              <a:t>4/17/2020</a:t>
+              <a:t>5/12/2020</a:t>
             </a:fld>
             <a:endParaRPr lang="en-US"/>
           </a:p>
@@ -1357,7 +1362,7 @@
           <a:p>
             <a:fld id="{6F146A8E-1171-4935-B627-E6ABE4D502B8}" type="datetimeFigureOut">
               <a:rPr lang="en-US" smtClean="0"/>
-              <a:t>4/17/2020</a:t>
+              <a:t>5/12/2020</a:t>
             </a:fld>
             <a:endParaRPr lang="en-US"/>
           </a:p>
@@ -1779,7 +1784,7 @@
           <a:p>
             <a:fld id="{6F146A8E-1171-4935-B627-E6ABE4D502B8}" type="datetimeFigureOut">
               <a:rPr lang="en-US" smtClean="0"/>
-              <a:t>4/17/2020</a:t>
+              <a:t>5/12/2020</a:t>
             </a:fld>
             <a:endParaRPr lang="en-US"/>
           </a:p>
@@ -1897,7 +1902,7 @@
           <a:p>
             <a:fld id="{6F146A8E-1171-4935-B627-E6ABE4D502B8}" type="datetimeFigureOut">
               <a:rPr lang="en-US" smtClean="0"/>
-              <a:t>4/17/2020</a:t>
+              <a:t>5/12/2020</a:t>
             </a:fld>
             <a:endParaRPr lang="en-US"/>
           </a:p>
@@ -1992,7 +1997,7 @@
           <a:p>
             <a:fld id="{6F146A8E-1171-4935-B627-E6ABE4D502B8}" type="datetimeFigureOut">
               <a:rPr lang="en-US" smtClean="0"/>
-              <a:t>4/17/2020</a:t>
+              <a:t>5/12/2020</a:t>
             </a:fld>
             <a:endParaRPr lang="en-US"/>
           </a:p>
@@ -2269,7 +2274,7 @@
           <a:p>
             <a:fld id="{6F146A8E-1171-4935-B627-E6ABE4D502B8}" type="datetimeFigureOut">
               <a:rPr lang="en-US" smtClean="0"/>
-              <a:t>4/17/2020</a:t>
+              <a:t>5/12/2020</a:t>
             </a:fld>
             <a:endParaRPr lang="en-US"/>
           </a:p>
@@ -2522,7 +2527,7 @@
           <a:p>
             <a:fld id="{6F146A8E-1171-4935-B627-E6ABE4D502B8}" type="datetimeFigureOut">
               <a:rPr lang="en-US" smtClean="0"/>
-              <a:t>4/17/2020</a:t>
+              <a:t>5/12/2020</a:t>
             </a:fld>
             <a:endParaRPr lang="en-US"/>
           </a:p>
@@ -2735,7 +2740,7 @@
           <a:p>
             <a:fld id="{6F146A8E-1171-4935-B627-E6ABE4D502B8}" type="datetimeFigureOut">
               <a:rPr lang="en-US" smtClean="0"/>
-              <a:t>4/17/2020</a:t>
+              <a:t>5/12/2020</a:t>
             </a:fld>
             <a:endParaRPr lang="en-US"/>
           </a:p>
@@ -3223,6 +3228,501 @@
         <p:spPr/>
         <p:txBody>
           <a:bodyPr>
+            <a:normAutofit/>
+          </a:bodyPr>
+          <a:lstStyle/>
+          <a:p>
+            <a:r>
+              <a:rPr lang="en-US" dirty="0" smtClean="0"/>
+              <a:t>MC(</a:t>
+            </a:r>
+            <a:r>
+              <a:rPr lang="en-US" dirty="0" smtClean="0">
+                <a:sym typeface="Symbol"/>
+              </a:rPr>
+              <a:t></a:t>
+            </a:r>
+            <a:r>
+              <a:rPr lang="en-US" dirty="0" smtClean="0"/>
+              <a:t>), </a:t>
+            </a:r>
+            <a:r>
+              <a:rPr lang="en-US" dirty="0" smtClean="0">
+                <a:sym typeface="Symbol"/>
+              </a:rPr>
+              <a:t>=1, </a:t>
+            </a:r>
+            <a:r>
+              <a:rPr lang="en-US" dirty="0" smtClean="0"/>
+              <a:t>seed=1713, #</a:t>
+            </a:r>
+            <a:r>
+              <a:rPr lang="en-US" dirty="0" err="1" smtClean="0"/>
+              <a:t>exp</a:t>
+            </a:r>
+            <a:r>
+              <a:rPr lang="en-US" dirty="0" smtClean="0"/>
+              <a:t>=1</a:t>
+            </a:r>
+            <a:endParaRPr lang="en-US" dirty="0"/>
+          </a:p>
+        </p:txBody>
+      </p:sp>
+      <p:pic>
+        <p:nvPicPr>
+          <p:cNvPr id="11267" name="Picture 3"/>
+          <p:cNvPicPr>
+            <a:picLocks noChangeAspect="1" noChangeArrowheads="1"/>
+          </p:cNvPicPr>
+          <p:nvPr/>
+        </p:nvPicPr>
+        <p:blipFill rotWithShape="1">
+          <a:blip r:embed="rId2">
+            <a:extLst>
+              <a:ext uri="{28A0092B-C50C-407E-A947-70E740481C1C}">
+                <a14:useLocalDpi xmlns:a14="http://schemas.microsoft.com/office/drawing/2010/main" val="0"/>
+              </a:ext>
+            </a:extLst>
+          </a:blip>
+          <a:srcRect l="19769" t="16086"/>
+          <a:stretch/>
+        </p:blipFill>
+        <p:spPr bwMode="auto">
+          <a:xfrm>
+            <a:off x="251520" y="1628800"/>
+            <a:ext cx="8757907" cy="4948798"/>
+          </a:xfrm>
+          <a:prstGeom prst="rect">
+            <a:avLst/>
+          </a:prstGeom>
+          <a:noFill/>
+          <a:ln>
+            <a:noFill/>
+          </a:ln>
+          <a:extLst>
+            <a:ext uri="{909E8E84-426E-40DD-AFC4-6F175D3DCCD1}">
+              <a14:hiddenFill xmlns:a14="http://schemas.microsoft.com/office/drawing/2010/main">
+                <a:solidFill>
+                  <a:schemeClr val="accent1"/>
+                </a:solidFill>
+              </a14:hiddenFill>
+            </a:ext>
+            <a:ext uri="{91240B29-F687-4F45-9708-019B960494DF}">
+              <a14:hiddenLine xmlns:a14="http://schemas.microsoft.com/office/drawing/2010/main" w="9525">
+                <a:solidFill>
+                  <a:schemeClr val="tx1"/>
+                </a:solidFill>
+                <a:miter lim="800000"/>
+                <a:headEnd/>
+                <a:tailEnd/>
+              </a14:hiddenLine>
+            </a:ext>
+          </a:extLst>
+        </p:spPr>
+      </p:pic>
+    </p:spTree>
+    <p:extLst>
+      <p:ext uri="{BB962C8B-B14F-4D97-AF65-F5344CB8AC3E}">
+        <p14:creationId xmlns:p14="http://schemas.microsoft.com/office/powerpoint/2010/main" val="1231966260"/>
+      </p:ext>
+    </p:extLst>
+  </p:cSld>
+  <p:clrMapOvr>
+    <a:masterClrMapping/>
+  </p:clrMapOvr>
+</p:sld>
+</file>
+
+<file path=ppt/slides/slide11.xml><?xml version="1.0" encoding="utf-8"?>
+<p:sld xmlns:a="http://schemas.openxmlformats.org/drawingml/2006/main" xmlns:r="http://schemas.openxmlformats.org/officeDocument/2006/relationships" xmlns:p="http://schemas.openxmlformats.org/presentationml/2006/main">
+  <p:cSld>
+    <p:spTree>
+      <p:nvGrpSpPr>
+        <p:cNvPr id="1" name=""/>
+        <p:cNvGrpSpPr/>
+        <p:nvPr/>
+      </p:nvGrpSpPr>
+      <p:grpSpPr>
+        <a:xfrm>
+          <a:off x="0" y="0"/>
+          <a:ext cx="0" cy="0"/>
+          <a:chOff x="0" y="0"/>
+          <a:chExt cx="0" cy="0"/>
+        </a:xfrm>
+      </p:grpSpPr>
+      <p:sp>
+        <p:nvSpPr>
+          <p:cNvPr id="2" name="Title 1"/>
+          <p:cNvSpPr>
+            <a:spLocks noGrp="1"/>
+          </p:cNvSpPr>
+          <p:nvPr>
+            <p:ph type="title"/>
+          </p:nvPr>
+        </p:nvSpPr>
+        <p:spPr/>
+        <p:txBody>
+          <a:bodyPr>
+            <a:normAutofit fontScale="90000"/>
+          </a:bodyPr>
+          <a:lstStyle/>
+          <a:p>
+            <a:r>
+              <a:rPr lang="en-US" dirty="0"/>
+              <a:t>MC(</a:t>
+            </a:r>
+            <a:r>
+              <a:rPr lang="en-US" dirty="0">
+                <a:sym typeface="Symbol"/>
+              </a:rPr>
+              <a:t></a:t>
+            </a:r>
+            <a:r>
+              <a:rPr lang="en-US" dirty="0"/>
+              <a:t>), </a:t>
+            </a:r>
+            <a:r>
+              <a:rPr lang="en-US" dirty="0">
+                <a:sym typeface="Symbol"/>
+              </a:rPr>
+              <a:t>=1, </a:t>
+            </a:r>
+            <a:r>
+              <a:rPr lang="en-US" dirty="0"/>
+              <a:t>seed=1713, #</a:t>
+            </a:r>
+            <a:r>
+              <a:rPr lang="en-US" dirty="0" err="1" smtClean="0"/>
+              <a:t>exp</a:t>
+            </a:r>
+            <a:r>
+              <a:rPr lang="en-US" dirty="0" smtClean="0"/>
+              <a:t>=1</a:t>
+            </a:r>
+            <a:br>
+              <a:rPr lang="en-US" dirty="0" smtClean="0"/>
+            </a:br>
+            <a:r>
+              <a:rPr lang="en-US" sz="2200" i="1" dirty="0">
+                <a:solidFill>
+                  <a:prstClr val="black"/>
+                </a:solidFill>
+              </a:rPr>
+              <a:t>Tue, 12-May-2020: After </a:t>
+            </a:r>
+            <a:r>
+              <a:rPr lang="en-US" sz="2200" i="1" dirty="0" smtClean="0">
+                <a:solidFill>
+                  <a:prstClr val="black"/>
+                </a:solidFill>
+              </a:rPr>
+              <a:t>fixing a few things in the code (check Tasks Excel)</a:t>
+            </a:r>
+            <a:br>
+              <a:rPr lang="en-US" sz="2200" i="1" dirty="0" smtClean="0">
+                <a:solidFill>
+                  <a:prstClr val="black"/>
+                </a:solidFill>
+              </a:rPr>
+            </a:br>
+            <a:r>
+              <a:rPr lang="en-US" sz="2200" i="1" dirty="0" smtClean="0">
+                <a:solidFill>
+                  <a:prstClr val="black"/>
+                </a:solidFill>
+              </a:rPr>
+              <a:t>EVERY VISIT </a:t>
+            </a:r>
+            <a:r>
+              <a:rPr lang="en-US" sz="2200" i="1" dirty="0" smtClean="0">
+                <a:solidFill>
+                  <a:prstClr val="black"/>
+                </a:solidFill>
+                <a:sym typeface="Symbol"/>
+              </a:rPr>
+              <a:t>-return</a:t>
+            </a:r>
+            <a:endParaRPr lang="en-US" dirty="0"/>
+          </a:p>
+        </p:txBody>
+      </p:sp>
+      <p:pic>
+        <p:nvPicPr>
+          <p:cNvPr id="2050" name="Picture 2"/>
+          <p:cNvPicPr>
+            <a:picLocks noChangeAspect="1" noChangeArrowheads="1"/>
+          </p:cNvPicPr>
+          <p:nvPr/>
+        </p:nvPicPr>
+        <p:blipFill>
+          <a:blip r:embed="rId2">
+            <a:extLst>
+              <a:ext uri="{28A0092B-C50C-407E-A947-70E740481C1C}">
+                <a14:useLocalDpi xmlns:a14="http://schemas.microsoft.com/office/drawing/2010/main" val="0"/>
+              </a:ext>
+            </a:extLst>
+          </a:blip>
+          <a:srcRect/>
+          <a:stretch>
+            <a:fillRect/>
+          </a:stretch>
+        </p:blipFill>
+        <p:spPr bwMode="auto">
+          <a:xfrm>
+            <a:off x="246878" y="1988840"/>
+            <a:ext cx="8676456" cy="4338228"/>
+          </a:xfrm>
+          <a:prstGeom prst="rect">
+            <a:avLst/>
+          </a:prstGeom>
+          <a:noFill/>
+          <a:ln>
+            <a:noFill/>
+          </a:ln>
+          <a:extLst>
+            <a:ext uri="{909E8E84-426E-40DD-AFC4-6F175D3DCCD1}">
+              <a14:hiddenFill xmlns:a14="http://schemas.microsoft.com/office/drawing/2010/main">
+                <a:solidFill>
+                  <a:schemeClr val="accent1"/>
+                </a:solidFill>
+              </a14:hiddenFill>
+            </a:ext>
+            <a:ext uri="{91240B29-F687-4F45-9708-019B960494DF}">
+              <a14:hiddenLine xmlns:a14="http://schemas.microsoft.com/office/drawing/2010/main" w="9525">
+                <a:solidFill>
+                  <a:schemeClr val="tx1"/>
+                </a:solidFill>
+                <a:miter lim="800000"/>
+                <a:headEnd/>
+                <a:tailEnd/>
+              </a14:hiddenLine>
+            </a:ext>
+          </a:extLst>
+        </p:spPr>
+      </p:pic>
+    </p:spTree>
+    <p:extLst>
+      <p:ext uri="{BB962C8B-B14F-4D97-AF65-F5344CB8AC3E}">
+        <p14:creationId xmlns:p14="http://schemas.microsoft.com/office/powerpoint/2010/main" val="368365517"/>
+      </p:ext>
+    </p:extLst>
+  </p:cSld>
+  <p:clrMapOvr>
+    <a:masterClrMapping/>
+  </p:clrMapOvr>
+</p:sld>
+</file>
+
+<file path=ppt/slides/slide12.xml><?xml version="1.0" encoding="utf-8"?>
+<p:sld xmlns:a="http://schemas.openxmlformats.org/drawingml/2006/main" xmlns:r="http://schemas.openxmlformats.org/officeDocument/2006/relationships" xmlns:p="http://schemas.openxmlformats.org/presentationml/2006/main">
+  <p:cSld>
+    <p:spTree>
+      <p:nvGrpSpPr>
+        <p:cNvPr id="1" name=""/>
+        <p:cNvGrpSpPr/>
+        <p:nvPr/>
+      </p:nvGrpSpPr>
+      <p:grpSpPr>
+        <a:xfrm>
+          <a:off x="0" y="0"/>
+          <a:ext cx="0" cy="0"/>
+          <a:chOff x="0" y="0"/>
+          <a:chExt cx="0" cy="0"/>
+        </a:xfrm>
+      </p:grpSpPr>
+      <p:sp>
+        <p:nvSpPr>
+          <p:cNvPr id="2" name="Title 1"/>
+          <p:cNvSpPr>
+            <a:spLocks noGrp="1"/>
+          </p:cNvSpPr>
+          <p:nvPr>
+            <p:ph type="title"/>
+          </p:nvPr>
+        </p:nvSpPr>
+        <p:spPr/>
+        <p:txBody>
+          <a:bodyPr>
+            <a:normAutofit fontScale="90000"/>
+          </a:bodyPr>
+          <a:lstStyle/>
+          <a:p>
+            <a:r>
+              <a:rPr lang="en-US" dirty="0"/>
+              <a:t>MC(</a:t>
+            </a:r>
+            <a:r>
+              <a:rPr lang="en-US" dirty="0">
+                <a:sym typeface="Symbol"/>
+              </a:rPr>
+              <a:t></a:t>
+            </a:r>
+            <a:r>
+              <a:rPr lang="en-US" dirty="0"/>
+              <a:t>), </a:t>
+            </a:r>
+            <a:r>
+              <a:rPr lang="en-US" dirty="0">
+                <a:sym typeface="Symbol"/>
+              </a:rPr>
+              <a:t>=1, </a:t>
+            </a:r>
+            <a:r>
+              <a:rPr lang="en-US" dirty="0"/>
+              <a:t>seed=1713, #</a:t>
+            </a:r>
+            <a:r>
+              <a:rPr lang="en-US" dirty="0" err="1" smtClean="0"/>
+              <a:t>exp</a:t>
+            </a:r>
+            <a:r>
+              <a:rPr lang="en-US" dirty="0" smtClean="0"/>
+              <a:t>=1</a:t>
+            </a:r>
+            <a:br>
+              <a:rPr lang="en-US" dirty="0" smtClean="0"/>
+            </a:br>
+            <a:r>
+              <a:rPr lang="en-US" sz="2200" i="1" dirty="0">
+                <a:solidFill>
+                  <a:prstClr val="black"/>
+                </a:solidFill>
+              </a:rPr>
+              <a:t>Tue, 12-May-2020: After </a:t>
+            </a:r>
+            <a:r>
+              <a:rPr lang="en-US" sz="2200" i="1" dirty="0" smtClean="0">
+                <a:solidFill>
+                  <a:prstClr val="black"/>
+                </a:solidFill>
+              </a:rPr>
+              <a:t>fixing a few things in the code (check Tasks Excel)</a:t>
+            </a:r>
+            <a:br>
+              <a:rPr lang="en-US" sz="2200" i="1" dirty="0" smtClean="0">
+                <a:solidFill>
+                  <a:prstClr val="black"/>
+                </a:solidFill>
+              </a:rPr>
+            </a:br>
+            <a:r>
+              <a:rPr lang="en-US" sz="2200" i="1" dirty="0" smtClean="0">
+                <a:solidFill>
+                  <a:prstClr val="black"/>
+                </a:solidFill>
+              </a:rPr>
+              <a:t>FIRST VISIT </a:t>
+            </a:r>
+            <a:r>
+              <a:rPr lang="en-US" sz="2200" i="1" dirty="0" smtClean="0">
+                <a:solidFill>
+                  <a:prstClr val="black"/>
+                </a:solidFill>
+                <a:sym typeface="Symbol"/>
+              </a:rPr>
+              <a:t>-return</a:t>
+            </a:r>
+            <a:endParaRPr lang="en-US" dirty="0"/>
+          </a:p>
+        </p:txBody>
+      </p:sp>
+      <p:pic>
+        <p:nvPicPr>
+          <p:cNvPr id="3074" name="Picture 2"/>
+          <p:cNvPicPr>
+            <a:picLocks noChangeAspect="1" noChangeArrowheads="1"/>
+          </p:cNvPicPr>
+          <p:nvPr/>
+        </p:nvPicPr>
+        <p:blipFill>
+          <a:blip r:embed="rId2">
+            <a:extLst>
+              <a:ext uri="{28A0092B-C50C-407E-A947-70E740481C1C}">
+                <a14:useLocalDpi xmlns:a14="http://schemas.microsoft.com/office/drawing/2010/main" val="0"/>
+              </a:ext>
+            </a:extLst>
+          </a:blip>
+          <a:srcRect/>
+          <a:stretch>
+            <a:fillRect/>
+          </a:stretch>
+        </p:blipFill>
+        <p:spPr bwMode="auto">
+          <a:xfrm>
+            <a:off x="395536" y="1983589"/>
+            <a:ext cx="8460432" cy="4290525"/>
+          </a:xfrm>
+          <a:prstGeom prst="rect">
+            <a:avLst/>
+          </a:prstGeom>
+          <a:noFill/>
+          <a:ln>
+            <a:noFill/>
+          </a:ln>
+          <a:extLst>
+            <a:ext uri="{909E8E84-426E-40DD-AFC4-6F175D3DCCD1}">
+              <a14:hiddenFill xmlns:a14="http://schemas.microsoft.com/office/drawing/2010/main">
+                <a:solidFill>
+                  <a:schemeClr val="accent1"/>
+                </a:solidFill>
+              </a14:hiddenFill>
+            </a:ext>
+            <a:ext uri="{91240B29-F687-4F45-9708-019B960494DF}">
+              <a14:hiddenLine xmlns:a14="http://schemas.microsoft.com/office/drawing/2010/main" w="9525">
+                <a:solidFill>
+                  <a:schemeClr val="tx1"/>
+                </a:solidFill>
+                <a:miter lim="800000"/>
+                <a:headEnd/>
+                <a:tailEnd/>
+              </a14:hiddenLine>
+            </a:ext>
+          </a:extLst>
+        </p:spPr>
+      </p:pic>
+    </p:spTree>
+    <p:extLst>
+      <p:ext uri="{BB962C8B-B14F-4D97-AF65-F5344CB8AC3E}">
+        <p14:creationId xmlns:p14="http://schemas.microsoft.com/office/powerpoint/2010/main" val="2439052910"/>
+      </p:ext>
+    </p:extLst>
+  </p:cSld>
+  <p:clrMapOvr>
+    <a:masterClrMapping/>
+  </p:clrMapOvr>
+</p:sld>
+</file>
+
+<file path=ppt/slides/slide13.xml><?xml version="1.0" encoding="utf-8"?>
+<p:sld xmlns:a="http://schemas.openxmlformats.org/drawingml/2006/main" xmlns:r="http://schemas.openxmlformats.org/officeDocument/2006/relationships" xmlns:p="http://schemas.openxmlformats.org/presentationml/2006/main">
+  <p:cSld>
+    <p:spTree>
+      <p:nvGrpSpPr>
+        <p:cNvPr id="1" name=""/>
+        <p:cNvGrpSpPr/>
+        <p:nvPr/>
+      </p:nvGrpSpPr>
+      <p:grpSpPr>
+        <a:xfrm>
+          <a:off x="0" y="0"/>
+          <a:ext cx="0" cy="0"/>
+          <a:chOff x="0" y="0"/>
+          <a:chExt cx="0" cy="0"/>
+        </a:xfrm>
+      </p:grpSpPr>
+      <p:sp>
+        <p:nvSpPr>
+          <p:cNvPr id="2" name="Title 1"/>
+          <p:cNvSpPr>
+            <a:spLocks noGrp="1"/>
+          </p:cNvSpPr>
+          <p:nvPr>
+            <p:ph type="title"/>
+          </p:nvPr>
+        </p:nvSpPr>
+        <p:spPr/>
+        <p:txBody>
+          <a:bodyPr>
             <a:normAutofit fontScale="90000"/>
           </a:bodyPr>
           <a:lstStyle/>
@@ -3368,7 +3868,7 @@
 </p:sld>
 </file>
 
-<file path=ppt/slides/slide11.xml><?xml version="1.0" encoding="utf-8"?>
+<file path=ppt/slides/slide14.xml><?xml version="1.0" encoding="utf-8"?>
 <p:sld xmlns:a="http://schemas.openxmlformats.org/drawingml/2006/main" xmlns:r="http://schemas.openxmlformats.org/officeDocument/2006/relationships" xmlns:p="http://schemas.openxmlformats.org/presentationml/2006/main">
   <p:cSld>
     <p:spTree>
@@ -3542,7 +4042,7 @@
 </p:sld>
 </file>
 
-<file path=ppt/slides/slide12.xml><?xml version="1.0" encoding="utf-8"?>
+<file path=ppt/slides/slide15.xml><?xml version="1.0" encoding="utf-8"?>
 <p:sld xmlns:a="http://schemas.openxmlformats.org/drawingml/2006/main" xmlns:r="http://schemas.openxmlformats.org/officeDocument/2006/relationships" xmlns:p="http://schemas.openxmlformats.org/presentationml/2006/main">
   <p:cSld>
     <p:spTree>
@@ -3716,7 +4216,7 @@
 </p:sld>
 </file>
 
-<file path=ppt/slides/slide13.xml><?xml version="1.0" encoding="utf-8"?>
+<file path=ppt/slides/slide16.xml><?xml version="1.0" encoding="utf-8"?>
 <p:sld xmlns:a="http://schemas.openxmlformats.org/drawingml/2006/main" xmlns:r="http://schemas.openxmlformats.org/officeDocument/2006/relationships" xmlns:p="http://schemas.openxmlformats.org/presentationml/2006/main">
   <p:cSld>
     <p:spTree>
@@ -3851,7 +4351,7 @@
 </p:sld>
 </file>
 
-<file path=ppt/slides/slide14.xml><?xml version="1.0" encoding="utf-8"?>
+<file path=ppt/slides/slide17.xml><?xml version="1.0" encoding="utf-8"?>
 <p:sld xmlns:a="http://schemas.openxmlformats.org/drawingml/2006/main" xmlns:r="http://schemas.openxmlformats.org/officeDocument/2006/relationships" xmlns:p="http://schemas.openxmlformats.org/presentationml/2006/main">
   <p:cSld>
     <p:spTree>
@@ -4010,7 +4510,7 @@
 </p:sld>
 </file>
 
-<file path=ppt/slides/slide15.xml><?xml version="1.0" encoding="utf-8"?>
+<file path=ppt/slides/slide18.xml><?xml version="1.0" encoding="utf-8"?>
 <p:sld xmlns:a="http://schemas.openxmlformats.org/drawingml/2006/main" xmlns:r="http://schemas.openxmlformats.org/officeDocument/2006/relationships" xmlns:p="http://schemas.openxmlformats.org/presentationml/2006/main">
   <p:cSld>
     <p:spTree>
@@ -4222,7 +4722,7 @@
 </p:sld>
 </file>
 
-<file path=ppt/slides/slide16.xml><?xml version="1.0" encoding="utf-8"?>
+<file path=ppt/slides/slide19.xml><?xml version="1.0" encoding="utf-8"?>
 <p:sld xmlns:a="http://schemas.openxmlformats.org/drawingml/2006/main" xmlns:r="http://schemas.openxmlformats.org/officeDocument/2006/relationships" xmlns:p="http://schemas.openxmlformats.org/presentationml/2006/main">
   <p:cSld>
     <p:spTree>
@@ -4543,6 +5043,560 @@
 </p:sld>
 </file>
 
+<file path=ppt/slides/slide20.xml><?xml version="1.0" encoding="utf-8"?>
+<p:sld xmlns:a="http://schemas.openxmlformats.org/drawingml/2006/main" xmlns:r="http://schemas.openxmlformats.org/officeDocument/2006/relationships" xmlns:p="http://schemas.openxmlformats.org/presentationml/2006/main">
+  <p:cSld>
+    <p:spTree>
+      <p:nvGrpSpPr>
+        <p:cNvPr id="1" name=""/>
+        <p:cNvGrpSpPr/>
+        <p:nvPr/>
+      </p:nvGrpSpPr>
+      <p:grpSpPr>
+        <a:xfrm>
+          <a:off x="0" y="0"/>
+          <a:ext cx="0" cy="0"/>
+          <a:chOff x="0" y="0"/>
+          <a:chExt cx="0" cy="0"/>
+        </a:xfrm>
+      </p:grpSpPr>
+      <p:sp>
+        <p:nvSpPr>
+          <p:cNvPr id="2" name="Title 1"/>
+          <p:cNvSpPr>
+            <a:spLocks noGrp="1"/>
+          </p:cNvSpPr>
+          <p:nvPr>
+            <p:ph type="title"/>
+          </p:nvPr>
+        </p:nvSpPr>
+        <p:spPr/>
+        <p:txBody>
+          <a:bodyPr>
+            <a:normAutofit fontScale="90000"/>
+          </a:bodyPr>
+          <a:lstStyle/>
+          <a:p>
+            <a:r>
+              <a:rPr lang="en-US" dirty="0" smtClean="0"/>
+              <a:t>Convergence of TD(0)</a:t>
+            </a:r>
+            <a:br>
+              <a:rPr lang="en-US" dirty="0" smtClean="0"/>
+            </a:br>
+            <a:r>
+              <a:rPr lang="en-US" dirty="0" smtClean="0"/>
+              <a:t>12-May-2020</a:t>
+            </a:r>
+            <a:endParaRPr lang="en-US" dirty="0"/>
+          </a:p>
+        </p:txBody>
+      </p:sp>
+      <p:sp>
+        <p:nvSpPr>
+          <p:cNvPr id="3" name="Content Placeholder 2"/>
+          <p:cNvSpPr>
+            <a:spLocks noGrp="1"/>
+          </p:cNvSpPr>
+          <p:nvPr>
+            <p:ph idx="1"/>
+          </p:nvPr>
+        </p:nvSpPr>
+        <p:spPr/>
+        <p:txBody>
+          <a:bodyPr>
+            <a:normAutofit/>
+          </a:bodyPr>
+          <a:lstStyle/>
+          <a:p>
+            <a:pPr marL="0" indent="0">
+              <a:buNone/>
+            </a:pPr>
+            <a:r>
+              <a:rPr lang="en-US" sz="2800" dirty="0" smtClean="0">
+                <a:sym typeface="Symbol"/>
+              </a:rPr>
+              <a:t>We need to use an initial  that is sufficiently large.</a:t>
+            </a:r>
+          </a:p>
+          <a:p>
+            <a:pPr marL="0" indent="0">
+              <a:buNone/>
+            </a:pPr>
+            <a:r>
+              <a:rPr lang="en-US" sz="2800" dirty="0" smtClean="0">
+                <a:sym typeface="Symbol"/>
+              </a:rPr>
+              <a:t></a:t>
+            </a:r>
+            <a:r>
+              <a:rPr lang="en-US" sz="2800" baseline="-25000" dirty="0" smtClean="0">
+                <a:sym typeface="Symbol"/>
+              </a:rPr>
+              <a:t>0</a:t>
+            </a:r>
+            <a:r>
+              <a:rPr lang="en-US" sz="2800" dirty="0" smtClean="0">
+                <a:sym typeface="Symbol"/>
+              </a:rPr>
+              <a:t> = 1.5, decay with state count</a:t>
+            </a:r>
+            <a:endParaRPr lang="en-US" sz="2800" dirty="0"/>
+          </a:p>
+        </p:txBody>
+      </p:sp>
+      <p:pic>
+        <p:nvPicPr>
+          <p:cNvPr id="1029" name="Picture 5"/>
+          <p:cNvPicPr>
+            <a:picLocks noChangeAspect="1" noChangeArrowheads="1"/>
+          </p:cNvPicPr>
+          <p:nvPr/>
+        </p:nvPicPr>
+        <p:blipFill>
+          <a:blip r:embed="rId2">
+            <a:extLst>
+              <a:ext uri="{28A0092B-C50C-407E-A947-70E740481C1C}">
+                <a14:useLocalDpi xmlns:a14="http://schemas.microsoft.com/office/drawing/2010/main" val="0"/>
+              </a:ext>
+            </a:extLst>
+          </a:blip>
+          <a:srcRect/>
+          <a:stretch>
+            <a:fillRect/>
+          </a:stretch>
+        </p:blipFill>
+        <p:spPr bwMode="auto">
+          <a:xfrm>
+            <a:off x="4572000" y="2824088"/>
+            <a:ext cx="4133850" cy="3676650"/>
+          </a:xfrm>
+          <a:prstGeom prst="rect">
+            <a:avLst/>
+          </a:prstGeom>
+          <a:noFill/>
+          <a:ln>
+            <a:noFill/>
+          </a:ln>
+          <a:extLst>
+            <a:ext uri="{909E8E84-426E-40DD-AFC4-6F175D3DCCD1}">
+              <a14:hiddenFill xmlns:a14="http://schemas.microsoft.com/office/drawing/2010/main">
+                <a:solidFill>
+                  <a:schemeClr val="accent1"/>
+                </a:solidFill>
+              </a14:hiddenFill>
+            </a:ext>
+            <a:ext uri="{91240B29-F687-4F45-9708-019B960494DF}">
+              <a14:hiddenLine xmlns:a14="http://schemas.microsoft.com/office/drawing/2010/main" w="9525">
+                <a:solidFill>
+                  <a:schemeClr val="tx1"/>
+                </a:solidFill>
+                <a:miter lim="800000"/>
+                <a:headEnd/>
+                <a:tailEnd/>
+              </a14:hiddenLine>
+            </a:ext>
+          </a:extLst>
+        </p:spPr>
+      </p:pic>
+      <p:pic>
+        <p:nvPicPr>
+          <p:cNvPr id="1030" name="Picture 6"/>
+          <p:cNvPicPr>
+            <a:picLocks noChangeAspect="1" noChangeArrowheads="1"/>
+          </p:cNvPicPr>
+          <p:nvPr/>
+        </p:nvPicPr>
+        <p:blipFill>
+          <a:blip r:embed="rId3">
+            <a:extLst>
+              <a:ext uri="{28A0092B-C50C-407E-A947-70E740481C1C}">
+                <a14:useLocalDpi xmlns:a14="http://schemas.microsoft.com/office/drawing/2010/main" val="0"/>
+              </a:ext>
+            </a:extLst>
+          </a:blip>
+          <a:srcRect/>
+          <a:stretch>
+            <a:fillRect/>
+          </a:stretch>
+        </p:blipFill>
+        <p:spPr bwMode="auto">
+          <a:xfrm>
+            <a:off x="251520" y="2826658"/>
+            <a:ext cx="4133850" cy="3676650"/>
+          </a:xfrm>
+          <a:prstGeom prst="rect">
+            <a:avLst/>
+          </a:prstGeom>
+          <a:noFill/>
+          <a:ln>
+            <a:noFill/>
+          </a:ln>
+          <a:extLst>
+            <a:ext uri="{909E8E84-426E-40DD-AFC4-6F175D3DCCD1}">
+              <a14:hiddenFill xmlns:a14="http://schemas.microsoft.com/office/drawing/2010/main">
+                <a:solidFill>
+                  <a:schemeClr val="accent1"/>
+                </a:solidFill>
+              </a14:hiddenFill>
+            </a:ext>
+            <a:ext uri="{91240B29-F687-4F45-9708-019B960494DF}">
+              <a14:hiddenLine xmlns:a14="http://schemas.microsoft.com/office/drawing/2010/main" w="9525">
+                <a:solidFill>
+                  <a:schemeClr val="tx1"/>
+                </a:solidFill>
+                <a:miter lim="800000"/>
+                <a:headEnd/>
+                <a:tailEnd/>
+              </a14:hiddenLine>
+            </a:ext>
+          </a:extLst>
+        </p:spPr>
+      </p:pic>
+      <p:pic>
+        <p:nvPicPr>
+          <p:cNvPr id="1031" name="Picture 7"/>
+          <p:cNvPicPr>
+            <a:picLocks noChangeAspect="1" noChangeArrowheads="1"/>
+          </p:cNvPicPr>
+          <p:nvPr/>
+        </p:nvPicPr>
+        <p:blipFill>
+          <a:blip r:embed="rId4">
+            <a:extLst>
+              <a:ext uri="{28A0092B-C50C-407E-A947-70E740481C1C}">
+                <a14:useLocalDpi xmlns:a14="http://schemas.microsoft.com/office/drawing/2010/main" val="0"/>
+              </a:ext>
+            </a:extLst>
+          </a:blip>
+          <a:srcRect/>
+          <a:stretch>
+            <a:fillRect/>
+          </a:stretch>
+        </p:blipFill>
+        <p:spPr bwMode="auto">
+          <a:xfrm>
+            <a:off x="2505075" y="2832855"/>
+            <a:ext cx="4133850" cy="3676650"/>
+          </a:xfrm>
+          <a:prstGeom prst="rect">
+            <a:avLst/>
+          </a:prstGeom>
+          <a:noFill/>
+          <a:ln>
+            <a:noFill/>
+          </a:ln>
+          <a:extLst>
+            <a:ext uri="{909E8E84-426E-40DD-AFC4-6F175D3DCCD1}">
+              <a14:hiddenFill xmlns:a14="http://schemas.microsoft.com/office/drawing/2010/main">
+                <a:solidFill>
+                  <a:schemeClr val="accent1"/>
+                </a:solidFill>
+              </a14:hiddenFill>
+            </a:ext>
+            <a:ext uri="{91240B29-F687-4F45-9708-019B960494DF}">
+              <a14:hiddenLine xmlns:a14="http://schemas.microsoft.com/office/drawing/2010/main" w="9525">
+                <a:solidFill>
+                  <a:schemeClr val="tx1"/>
+                </a:solidFill>
+                <a:miter lim="800000"/>
+                <a:headEnd/>
+                <a:tailEnd/>
+              </a14:hiddenLine>
+            </a:ext>
+          </a:extLst>
+        </p:spPr>
+      </p:pic>
+    </p:spTree>
+    <p:extLst>
+      <p:ext uri="{BB962C8B-B14F-4D97-AF65-F5344CB8AC3E}">
+        <p14:creationId xmlns:p14="http://schemas.microsoft.com/office/powerpoint/2010/main" val="2254220862"/>
+      </p:ext>
+    </p:extLst>
+  </p:cSld>
+  <p:clrMapOvr>
+    <a:masterClrMapping/>
+  </p:clrMapOvr>
+</p:sld>
+</file>
+
+<file path=ppt/slides/slide21.xml><?xml version="1.0" encoding="utf-8"?>
+<p:sld xmlns:a="http://schemas.openxmlformats.org/drawingml/2006/main" xmlns:r="http://schemas.openxmlformats.org/officeDocument/2006/relationships" xmlns:p="http://schemas.openxmlformats.org/presentationml/2006/main">
+  <p:cSld>
+    <p:spTree>
+      <p:nvGrpSpPr>
+        <p:cNvPr id="1" name=""/>
+        <p:cNvGrpSpPr/>
+        <p:nvPr/>
+      </p:nvGrpSpPr>
+      <p:grpSpPr>
+        <a:xfrm>
+          <a:off x="0" y="0"/>
+          <a:ext cx="0" cy="0"/>
+          <a:chOff x="0" y="0"/>
+          <a:chExt cx="0" cy="0"/>
+        </a:xfrm>
+      </p:grpSpPr>
+      <p:sp>
+        <p:nvSpPr>
+          <p:cNvPr id="2" name="Title 1"/>
+          <p:cNvSpPr>
+            <a:spLocks noGrp="1"/>
+          </p:cNvSpPr>
+          <p:nvPr>
+            <p:ph type="title"/>
+          </p:nvPr>
+        </p:nvSpPr>
+        <p:spPr/>
+        <p:txBody>
+          <a:bodyPr>
+            <a:normAutofit fontScale="90000"/>
+          </a:bodyPr>
+          <a:lstStyle/>
+          <a:p>
+            <a:r>
+              <a:rPr lang="en-US" dirty="0" smtClean="0"/>
+              <a:t>Convergence of TD(0)</a:t>
+            </a:r>
+            <a:br>
+              <a:rPr lang="en-US" dirty="0" smtClean="0"/>
+            </a:br>
+            <a:r>
+              <a:rPr lang="en-US" dirty="0" smtClean="0"/>
+              <a:t>12-May-2020</a:t>
+            </a:r>
+            <a:endParaRPr lang="en-US" dirty="0"/>
+          </a:p>
+        </p:txBody>
+      </p:sp>
+      <p:sp>
+        <p:nvSpPr>
+          <p:cNvPr id="3" name="Content Placeholder 2"/>
+          <p:cNvSpPr>
+            <a:spLocks noGrp="1"/>
+          </p:cNvSpPr>
+          <p:nvPr>
+            <p:ph idx="1"/>
+          </p:nvPr>
+        </p:nvSpPr>
+        <p:spPr/>
+        <p:txBody>
+          <a:bodyPr>
+            <a:normAutofit/>
+          </a:bodyPr>
+          <a:lstStyle/>
+          <a:p>
+            <a:pPr marL="0" indent="0">
+              <a:buNone/>
+            </a:pPr>
+            <a:r>
+              <a:rPr lang="en-US" sz="2800" dirty="0" smtClean="0">
+                <a:sym typeface="Symbol"/>
+              </a:rPr>
+              <a:t>We need to use an initial  that is sufficiently large.</a:t>
+            </a:r>
+          </a:p>
+          <a:p>
+            <a:pPr marL="0" indent="0">
+              <a:buNone/>
+            </a:pPr>
+            <a:r>
+              <a:rPr lang="en-US" sz="2800" dirty="0" smtClean="0">
+                <a:sym typeface="Symbol"/>
+              </a:rPr>
+              <a:t></a:t>
+            </a:r>
+            <a:r>
+              <a:rPr lang="en-US" sz="2800" baseline="-25000" dirty="0" smtClean="0">
+                <a:sym typeface="Symbol"/>
+              </a:rPr>
+              <a:t>0</a:t>
+            </a:r>
+            <a:r>
+              <a:rPr lang="en-US" sz="2800" dirty="0" smtClean="0">
+                <a:sym typeface="Symbol"/>
+              </a:rPr>
+              <a:t> = 2, decay with state count</a:t>
+            </a:r>
+            <a:endParaRPr lang="en-US" sz="2800" dirty="0"/>
+          </a:p>
+        </p:txBody>
+      </p:sp>
+      <p:pic>
+        <p:nvPicPr>
+          <p:cNvPr id="1026" name="Picture 2"/>
+          <p:cNvPicPr>
+            <a:picLocks noChangeAspect="1" noChangeArrowheads="1"/>
+          </p:cNvPicPr>
+          <p:nvPr/>
+        </p:nvPicPr>
+        <p:blipFill>
+          <a:blip r:embed="rId2">
+            <a:extLst>
+              <a:ext uri="{28A0092B-C50C-407E-A947-70E740481C1C}">
+                <a14:useLocalDpi xmlns:a14="http://schemas.microsoft.com/office/drawing/2010/main" val="0"/>
+              </a:ext>
+            </a:extLst>
+          </a:blip>
+          <a:srcRect/>
+          <a:stretch>
+            <a:fillRect/>
+          </a:stretch>
+        </p:blipFill>
+        <p:spPr bwMode="auto">
+          <a:xfrm>
+            <a:off x="4572000" y="2780928"/>
+            <a:ext cx="4133850" cy="3676650"/>
+          </a:xfrm>
+          <a:prstGeom prst="rect">
+            <a:avLst/>
+          </a:prstGeom>
+          <a:noFill/>
+          <a:ln>
+            <a:noFill/>
+          </a:ln>
+          <a:extLst>
+            <a:ext uri="{909E8E84-426E-40DD-AFC4-6F175D3DCCD1}">
+              <a14:hiddenFill xmlns:a14="http://schemas.microsoft.com/office/drawing/2010/main">
+                <a:solidFill>
+                  <a:schemeClr val="accent1"/>
+                </a:solidFill>
+              </a14:hiddenFill>
+            </a:ext>
+            <a:ext uri="{91240B29-F687-4F45-9708-019B960494DF}">
+              <a14:hiddenLine xmlns:a14="http://schemas.microsoft.com/office/drawing/2010/main" w="9525">
+                <a:solidFill>
+                  <a:schemeClr val="tx1"/>
+                </a:solidFill>
+                <a:miter lim="800000"/>
+                <a:headEnd/>
+                <a:tailEnd/>
+              </a14:hiddenLine>
+            </a:ext>
+          </a:extLst>
+        </p:spPr>
+      </p:pic>
+      <p:pic>
+        <p:nvPicPr>
+          <p:cNvPr id="1027" name="Picture 3"/>
+          <p:cNvPicPr>
+            <a:picLocks noChangeAspect="1" noChangeArrowheads="1"/>
+          </p:cNvPicPr>
+          <p:nvPr/>
+        </p:nvPicPr>
+        <p:blipFill>
+          <a:blip r:embed="rId3">
+            <a:extLst>
+              <a:ext uri="{28A0092B-C50C-407E-A947-70E740481C1C}">
+                <a14:useLocalDpi xmlns:a14="http://schemas.microsoft.com/office/drawing/2010/main" val="0"/>
+              </a:ext>
+            </a:extLst>
+          </a:blip>
+          <a:srcRect/>
+          <a:stretch>
+            <a:fillRect/>
+          </a:stretch>
+        </p:blipFill>
+        <p:spPr bwMode="auto">
+          <a:xfrm>
+            <a:off x="323528" y="2780049"/>
+            <a:ext cx="4133850" cy="3676650"/>
+          </a:xfrm>
+          <a:prstGeom prst="rect">
+            <a:avLst/>
+          </a:prstGeom>
+          <a:noFill/>
+          <a:ln>
+            <a:noFill/>
+          </a:ln>
+          <a:extLst>
+            <a:ext uri="{909E8E84-426E-40DD-AFC4-6F175D3DCCD1}">
+              <a14:hiddenFill xmlns:a14="http://schemas.microsoft.com/office/drawing/2010/main">
+                <a:solidFill>
+                  <a:schemeClr val="accent1"/>
+                </a:solidFill>
+              </a14:hiddenFill>
+            </a:ext>
+            <a:ext uri="{91240B29-F687-4F45-9708-019B960494DF}">
+              <a14:hiddenLine xmlns:a14="http://schemas.microsoft.com/office/drawing/2010/main" w="9525">
+                <a:solidFill>
+                  <a:schemeClr val="tx1"/>
+                </a:solidFill>
+                <a:miter lim="800000"/>
+                <a:headEnd/>
+                <a:tailEnd/>
+              </a14:hiddenLine>
+            </a:ext>
+          </a:extLst>
+        </p:spPr>
+      </p:pic>
+      <p:pic>
+        <p:nvPicPr>
+          <p:cNvPr id="1028" name="Picture 4"/>
+          <p:cNvPicPr>
+            <a:picLocks noChangeAspect="1" noChangeArrowheads="1"/>
+          </p:cNvPicPr>
+          <p:nvPr/>
+        </p:nvPicPr>
+        <p:blipFill>
+          <a:blip r:embed="rId4">
+            <a:extLst>
+              <a:ext uri="{28A0092B-C50C-407E-A947-70E740481C1C}">
+                <a14:useLocalDpi xmlns:a14="http://schemas.microsoft.com/office/drawing/2010/main" val="0"/>
+              </a:ext>
+            </a:extLst>
+          </a:blip>
+          <a:srcRect/>
+          <a:stretch>
+            <a:fillRect/>
+          </a:stretch>
+        </p:blipFill>
+        <p:spPr bwMode="auto">
+          <a:xfrm>
+            <a:off x="2505075" y="2801325"/>
+            <a:ext cx="4133850" cy="3676650"/>
+          </a:xfrm>
+          <a:prstGeom prst="rect">
+            <a:avLst/>
+          </a:prstGeom>
+          <a:noFill/>
+          <a:ln>
+            <a:noFill/>
+          </a:ln>
+          <a:extLst>
+            <a:ext uri="{909E8E84-426E-40DD-AFC4-6F175D3DCCD1}">
+              <a14:hiddenFill xmlns:a14="http://schemas.microsoft.com/office/drawing/2010/main">
+                <a:solidFill>
+                  <a:schemeClr val="accent1"/>
+                </a:solidFill>
+              </a14:hiddenFill>
+            </a:ext>
+            <a:ext uri="{91240B29-F687-4F45-9708-019B960494DF}">
+              <a14:hiddenLine xmlns:a14="http://schemas.microsoft.com/office/drawing/2010/main" w="9525">
+                <a:solidFill>
+                  <a:schemeClr val="tx1"/>
+                </a:solidFill>
+                <a:miter lim="800000"/>
+                <a:headEnd/>
+                <a:tailEnd/>
+              </a14:hiddenLine>
+            </a:ext>
+          </a:extLst>
+        </p:spPr>
+      </p:pic>
+    </p:spTree>
+    <p:extLst>
+      <p:ext uri="{BB962C8B-B14F-4D97-AF65-F5344CB8AC3E}">
+        <p14:creationId xmlns:p14="http://schemas.microsoft.com/office/powerpoint/2010/main" val="4105996571"/>
+      </p:ext>
+    </p:extLst>
+  </p:cSld>
+  <p:clrMapOvr>
+    <a:masterClrMapping/>
+  </p:clrMapOvr>
+</p:sld>
+</file>
+
 <file path=ppt/slides/slide3.xml><?xml version="1.0" encoding="utf-8"?>
 <p:sld xmlns:a="http://schemas.openxmlformats.org/drawingml/2006/main" xmlns:r="http://schemas.openxmlformats.org/officeDocument/2006/relationships" xmlns:p="http://schemas.openxmlformats.org/presentationml/2006/main">
   <p:cSld>
@@ -5123,13 +6177,13 @@
         <p:spPr/>
         <p:txBody>
           <a:bodyPr>
-            <a:normAutofit/>
+            <a:normAutofit fontScale="90000"/>
           </a:bodyPr>
           <a:lstStyle/>
           <a:p>
             <a:r>
               <a:rPr lang="en-US" dirty="0" smtClean="0"/>
-              <a:t>MC(</a:t>
+              <a:t>TD(</a:t>
             </a:r>
             <a:r>
               <a:rPr lang="en-US" dirty="0" smtClean="0">
@@ -5145,37 +6199,72 @@
               <a:rPr lang="en-US" dirty="0" smtClean="0">
                 <a:sym typeface="Symbol"/>
               </a:rPr>
-              <a:t>=0.9</a:t>
-            </a:r>
-            <a:r>
-              <a:rPr lang="en-US" smtClean="0">
+              <a:t>=1, </a:t>
+            </a:r>
+            <a:r>
+              <a:rPr lang="en-US" dirty="0" smtClean="0"/>
+              <a:t>seed=1713, #</a:t>
+            </a:r>
+            <a:r>
+              <a:rPr lang="en-US" dirty="0" err="1" smtClean="0"/>
+              <a:t>exp</a:t>
+            </a:r>
+            <a:r>
+              <a:rPr lang="en-US" dirty="0" smtClean="0"/>
+              <a:t>=1</a:t>
+            </a:r>
+            <a:br>
+              <a:rPr lang="en-US" dirty="0" smtClean="0"/>
+            </a:br>
+            <a:r>
+              <a:rPr lang="en-US" sz="2000" i="1" dirty="0" smtClean="0"/>
+              <a:t>Tue, 12-May-2020: After fixing </a:t>
+            </a:r>
+            <a:r>
+              <a:rPr lang="en-US" sz="2000" i="1" dirty="0" smtClean="0">
                 <a:sym typeface="Symbol"/>
               </a:rPr>
-              <a:t>, </a:t>
-            </a:r>
-            <a:r>
-              <a:rPr lang="en-US" smtClean="0"/>
-              <a:t>seed=1717</a:t>
-            </a:r>
-            <a:r>
-              <a:rPr lang="en-US" dirty="0" smtClean="0"/>
-              <a:t>, #</a:t>
-            </a:r>
-            <a:r>
-              <a:rPr lang="en-US" dirty="0" err="1" smtClean="0"/>
-              <a:t>exp</a:t>
-            </a:r>
-            <a:r>
-              <a:rPr lang="en-US" dirty="0" smtClean="0"/>
-              <a:t>=1</a:t>
-            </a:r>
-            <a:endParaRPr lang="en-US" dirty="0"/>
+              <a:t></a:t>
+            </a:r>
+            <a:r>
+              <a:rPr lang="en-US" sz="2000" i="1" dirty="0" smtClean="0"/>
+              <a:t> = 0 (earlier plots of </a:t>
+            </a:r>
+            <a:r>
+              <a:rPr lang="en-US" sz="2000" i="1" dirty="0">
+                <a:sym typeface="Symbol"/>
+              </a:rPr>
+              <a:t> = 0 </a:t>
+            </a:r>
+            <a:r>
+              <a:rPr lang="en-US" sz="2000" i="1" dirty="0" smtClean="0">
+                <a:sym typeface="Symbol"/>
+              </a:rPr>
+              <a:t>were actually for  </a:t>
+            </a:r>
+            <a:r>
+              <a:rPr lang="en-US" sz="2000" i="1" dirty="0">
+                <a:sym typeface="Symbol"/>
+              </a:rPr>
+              <a:t>= </a:t>
+            </a:r>
+            <a:r>
+              <a:rPr lang="en-US" sz="2000" i="1" dirty="0" smtClean="0">
+                <a:sym typeface="Symbol"/>
+              </a:rPr>
+              <a:t>0.8)</a:t>
+            </a:r>
+            <a:r>
+              <a:rPr lang="en-US" sz="2000" i="1" dirty="0" smtClean="0"/>
+              <a:t> and other fixes done as well</a:t>
+            </a:r>
+            <a:endParaRPr lang="en-US" sz="4000" i="1" dirty="0"/>
           </a:p>
         </p:txBody>
       </p:sp>
       <p:pic>
         <p:nvPicPr>
-          <p:cNvPr id="2050" name="Picture 2"/>
+          <p:cNvPr id="1026" name="Picture 2"/>
           <p:cNvPicPr>
             <a:picLocks noChangeAspect="1" noChangeArrowheads="1"/>
           </p:cNvPicPr>
@@ -5196,8 +6285,153 @@
         </p:blipFill>
         <p:spPr bwMode="auto">
           <a:xfrm>
-            <a:off x="179512" y="1556792"/>
-            <a:ext cx="9591278" cy="5181818"/>
+            <a:off x="107504" y="1844824"/>
+            <a:ext cx="8889944" cy="4484463"/>
+          </a:xfrm>
+          <a:prstGeom prst="rect">
+            <a:avLst/>
+          </a:prstGeom>
+          <a:noFill/>
+          <a:ln>
+            <a:noFill/>
+          </a:ln>
+          <a:extLst>
+            <a:ext uri="{909E8E84-426E-40DD-AFC4-6F175D3DCCD1}">
+              <a14:hiddenFill xmlns:a14="http://schemas.microsoft.com/office/drawing/2010/main">
+                <a:solidFill>
+                  <a:schemeClr val="accent1"/>
+                </a:solidFill>
+              </a14:hiddenFill>
+            </a:ext>
+            <a:ext uri="{91240B29-F687-4F45-9708-019B960494DF}">
+              <a14:hiddenLine xmlns:a14="http://schemas.microsoft.com/office/drawing/2010/main" w="9525">
+                <a:solidFill>
+                  <a:schemeClr val="tx1"/>
+                </a:solidFill>
+                <a:miter lim="800000"/>
+                <a:headEnd/>
+                <a:tailEnd/>
+              </a14:hiddenLine>
+            </a:ext>
+          </a:extLst>
+        </p:spPr>
+      </p:pic>
+    </p:spTree>
+    <p:extLst>
+      <p:ext uri="{BB962C8B-B14F-4D97-AF65-F5344CB8AC3E}">
+        <p14:creationId xmlns:p14="http://schemas.microsoft.com/office/powerpoint/2010/main" val="943449361"/>
+      </p:ext>
+    </p:extLst>
+  </p:cSld>
+  <p:clrMapOvr>
+    <a:masterClrMapping/>
+  </p:clrMapOvr>
+</p:sld>
+</file>
+
+<file path=ppt/slides/slide8.xml><?xml version="1.0" encoding="utf-8"?>
+<p:sld xmlns:a="http://schemas.openxmlformats.org/drawingml/2006/main" xmlns:r="http://schemas.openxmlformats.org/officeDocument/2006/relationships" xmlns:p="http://schemas.openxmlformats.org/presentationml/2006/main">
+  <p:cSld>
+    <p:spTree>
+      <p:nvGrpSpPr>
+        <p:cNvPr id="1" name=""/>
+        <p:cNvGrpSpPr/>
+        <p:nvPr/>
+      </p:nvGrpSpPr>
+      <p:grpSpPr>
+        <a:xfrm>
+          <a:off x="0" y="0"/>
+          <a:ext cx="0" cy="0"/>
+          <a:chOff x="0" y="0"/>
+          <a:chExt cx="0" cy="0"/>
+        </a:xfrm>
+      </p:grpSpPr>
+      <p:sp>
+        <p:nvSpPr>
+          <p:cNvPr id="2" name="Title 1"/>
+          <p:cNvSpPr>
+            <a:spLocks noGrp="1"/>
+          </p:cNvSpPr>
+          <p:nvPr>
+            <p:ph type="title"/>
+          </p:nvPr>
+        </p:nvSpPr>
+        <p:spPr/>
+        <p:txBody>
+          <a:bodyPr>
+            <a:normAutofit/>
+          </a:bodyPr>
+          <a:lstStyle/>
+          <a:p>
+            <a:r>
+              <a:rPr lang="en-US" dirty="0" smtClean="0"/>
+              <a:t>MC(</a:t>
+            </a:r>
+            <a:r>
+              <a:rPr lang="en-US" dirty="0" smtClean="0">
+                <a:sym typeface="Symbol"/>
+              </a:rPr>
+              <a:t></a:t>
+            </a:r>
+            <a:r>
+              <a:rPr lang="en-US" dirty="0" smtClean="0"/>
+              <a:t>), </a:t>
+            </a:r>
+            <a:r>
+              <a:rPr lang="en-US" dirty="0" smtClean="0">
+                <a:sym typeface="Symbol"/>
+              </a:rPr>
+              <a:t>=0.9</a:t>
+            </a:r>
+            <a:r>
+              <a:rPr lang="en-US" smtClean="0">
+                <a:sym typeface="Symbol"/>
+              </a:rPr>
+              <a:t>, </a:t>
+            </a:r>
+            <a:r>
+              <a:rPr lang="en-US" smtClean="0"/>
+              <a:t>seed=1717</a:t>
+            </a:r>
+            <a:r>
+              <a:rPr lang="en-US" dirty="0" smtClean="0"/>
+              <a:t>, #</a:t>
+            </a:r>
+            <a:r>
+              <a:rPr lang="en-US" dirty="0" err="1" smtClean="0"/>
+              <a:t>exp</a:t>
+            </a:r>
+            <a:r>
+              <a:rPr lang="en-US" dirty="0" smtClean="0"/>
+              <a:t>=1</a:t>
+            </a:r>
+            <a:endParaRPr lang="en-US" dirty="0"/>
+          </a:p>
+        </p:txBody>
+      </p:sp>
+      <p:pic>
+        <p:nvPicPr>
+          <p:cNvPr id="2050" name="Picture 2"/>
+          <p:cNvPicPr>
+            <a:picLocks noChangeAspect="1" noChangeArrowheads="1"/>
+          </p:cNvPicPr>
+          <p:nvPr/>
+        </p:nvPicPr>
+        <p:blipFill rotWithShape="1">
+          <a:blip r:embed="rId2">
+            <a:extLst>
+              <a:ext uri="{28A0092B-C50C-407E-A947-70E740481C1C}">
+                <a14:useLocalDpi xmlns:a14="http://schemas.microsoft.com/office/drawing/2010/main" val="0"/>
+              </a:ext>
+            </a:extLst>
+          </a:blip>
+          <a:srcRect l="19790" t="16755"/>
+          <a:stretch/>
+        </p:blipFill>
+        <p:spPr bwMode="auto">
+          <a:xfrm>
+            <a:off x="395536" y="1619787"/>
+            <a:ext cx="8213126" cy="4605096"/>
           </a:xfrm>
           <a:prstGeom prst="rect">
             <a:avLst/>
@@ -5240,7 +6474,7 @@
 </p:sld>
 </file>
 
-<file path=ppt/slides/slide8.xml><?xml version="1.0" encoding="utf-8"?>
+<file path=ppt/slides/slide9.xml><?xml version="1.0" encoding="utf-8"?>
 <p:sld xmlns:a="http://schemas.openxmlformats.org/drawingml/2006/main" xmlns:r="http://schemas.openxmlformats.org/officeDocument/2006/relationships" xmlns:p="http://schemas.openxmlformats.org/presentationml/2006/main">
   <p:cSld>
     <p:spTree>
@@ -5370,141 +6604,6 @@
     <p:extLst>
       <p:ext uri="{BB962C8B-B14F-4D97-AF65-F5344CB8AC3E}">
         <p14:creationId xmlns:p14="http://schemas.microsoft.com/office/powerpoint/2010/main" val="1487763123"/>
-      </p:ext>
-    </p:extLst>
-  </p:cSld>
-  <p:clrMapOvr>
-    <a:masterClrMapping/>
-  </p:clrMapOvr>
-</p:sld>
-</file>
-
-<file path=ppt/slides/slide9.xml><?xml version="1.0" encoding="utf-8"?>
-<p:sld xmlns:a="http://schemas.openxmlformats.org/drawingml/2006/main" xmlns:r="http://schemas.openxmlformats.org/officeDocument/2006/relationships" xmlns:p="http://schemas.openxmlformats.org/presentationml/2006/main">
-  <p:cSld>
-    <p:spTree>
-      <p:nvGrpSpPr>
-        <p:cNvPr id="1" name=""/>
-        <p:cNvGrpSpPr/>
-        <p:nvPr/>
-      </p:nvGrpSpPr>
-      <p:grpSpPr>
-        <a:xfrm>
-          <a:off x="0" y="0"/>
-          <a:ext cx="0" cy="0"/>
-          <a:chOff x="0" y="0"/>
-          <a:chExt cx="0" cy="0"/>
-        </a:xfrm>
-      </p:grpSpPr>
-      <p:sp>
-        <p:nvSpPr>
-          <p:cNvPr id="2" name="Title 1"/>
-          <p:cNvSpPr>
-            <a:spLocks noGrp="1"/>
-          </p:cNvSpPr>
-          <p:nvPr>
-            <p:ph type="title"/>
-          </p:nvPr>
-        </p:nvSpPr>
-        <p:spPr/>
-        <p:txBody>
-          <a:bodyPr>
-            <a:normAutofit/>
-          </a:bodyPr>
-          <a:lstStyle/>
-          <a:p>
-            <a:r>
-              <a:rPr lang="en-US" dirty="0" smtClean="0"/>
-              <a:t>MC(</a:t>
-            </a:r>
-            <a:r>
-              <a:rPr lang="en-US" dirty="0" smtClean="0">
-                <a:sym typeface="Symbol"/>
-              </a:rPr>
-              <a:t></a:t>
-            </a:r>
-            <a:r>
-              <a:rPr lang="en-US" dirty="0" smtClean="0"/>
-              <a:t>), </a:t>
-            </a:r>
-            <a:r>
-              <a:rPr lang="en-US" dirty="0" smtClean="0">
-                <a:sym typeface="Symbol"/>
-              </a:rPr>
-              <a:t>=1, </a:t>
-            </a:r>
-            <a:r>
-              <a:rPr lang="en-US" dirty="0" smtClean="0"/>
-              <a:t>seed=1713, #</a:t>
-            </a:r>
-            <a:r>
-              <a:rPr lang="en-US" dirty="0" err="1" smtClean="0"/>
-              <a:t>exp</a:t>
-            </a:r>
-            <a:r>
-              <a:rPr lang="en-US" dirty="0" smtClean="0"/>
-              <a:t>=1</a:t>
-            </a:r>
-            <a:endParaRPr lang="en-US" dirty="0"/>
-          </a:p>
-        </p:txBody>
-      </p:sp>
-      <p:pic>
-        <p:nvPicPr>
-          <p:cNvPr id="11267" name="Picture 3"/>
-          <p:cNvPicPr>
-            <a:picLocks noChangeAspect="1" noChangeArrowheads="1"/>
-          </p:cNvPicPr>
-          <p:nvPr/>
-        </p:nvPicPr>
-        <p:blipFill rotWithShape="1">
-          <a:blip r:embed="rId2">
-            <a:extLst>
-              <a:ext uri="{28A0092B-C50C-407E-A947-70E740481C1C}">
-                <a14:useLocalDpi xmlns:a14="http://schemas.microsoft.com/office/drawing/2010/main" val="0"/>
-              </a:ext>
-            </a:extLst>
-          </a:blip>
-          <a:srcRect l="19769" t="16086"/>
-          <a:stretch/>
-        </p:blipFill>
-        <p:spPr bwMode="auto">
-          <a:xfrm>
-            <a:off x="251520" y="1628800"/>
-            <a:ext cx="8757907" cy="4948798"/>
-          </a:xfrm>
-          <a:prstGeom prst="rect">
-            <a:avLst/>
-          </a:prstGeom>
-          <a:noFill/>
-          <a:ln>
-            <a:noFill/>
-          </a:ln>
-          <a:extLst>
-            <a:ext uri="{909E8E84-426E-40DD-AFC4-6F175D3DCCD1}">
-              <a14:hiddenFill xmlns:a14="http://schemas.microsoft.com/office/drawing/2010/main">
-                <a:solidFill>
-                  <a:schemeClr val="accent1"/>
-                </a:solidFill>
-              </a14:hiddenFill>
-            </a:ext>
-            <a:ext uri="{91240B29-F687-4F45-9708-019B960494DF}">
-              <a14:hiddenLine xmlns:a14="http://schemas.microsoft.com/office/drawing/2010/main" w="9525">
-                <a:solidFill>
-                  <a:schemeClr val="tx1"/>
-                </a:solidFill>
-                <a:miter lim="800000"/>
-                <a:headEnd/>
-                <a:tailEnd/>
-              </a14:hiddenLine>
-            </a:ext>
-          </a:extLst>
-        </p:spPr>
-      </p:pic>
-    </p:spTree>
-    <p:extLst>
-      <p:ext uri="{BB962C8B-B14F-4D97-AF65-F5344CB8AC3E}">
-        <p14:creationId xmlns:p14="http://schemas.microsoft.com/office/powerpoint/2010/main" val="1231966260"/>
       </p:ext>
     </p:extLst>
   </p:cSld>

</xml_diff>

<commit_message>
Cleaned up results; new results for TD(lambda) for different lambdas, and Adaptive TD(lambda) for different alphas
</commit_message>
<xml_diff>
--- a/RL-001-MemoryManagement/results/202004Apr17-TestsTDLambdaMCLamba-1DGridworld.pptx
+++ b/RL-001-MemoryManagement/results/202004Apr17-TestsTDLambdaMCLamba-1DGridworld.pptx
@@ -308,7 +308,7 @@
           <a:p>
             <a:fld id="{6F146A8E-1171-4935-B627-E6ABE4D502B8}" type="datetimeFigureOut">
               <a:rPr lang="en-US" smtClean="0"/>
-              <a:t>5/12/2020</a:t>
+              <a:t>5/14/2020</a:t>
             </a:fld>
             <a:endParaRPr lang="en-US"/>
           </a:p>
@@ -478,7 +478,7 @@
           <a:p>
             <a:fld id="{6F146A8E-1171-4935-B627-E6ABE4D502B8}" type="datetimeFigureOut">
               <a:rPr lang="en-US" smtClean="0"/>
-              <a:t>5/12/2020</a:t>
+              <a:t>5/14/2020</a:t>
             </a:fld>
             <a:endParaRPr lang="en-US"/>
           </a:p>
@@ -658,7 +658,7 @@
           <a:p>
             <a:fld id="{6F146A8E-1171-4935-B627-E6ABE4D502B8}" type="datetimeFigureOut">
               <a:rPr lang="en-US" smtClean="0"/>
-              <a:t>5/12/2020</a:t>
+              <a:t>5/14/2020</a:t>
             </a:fld>
             <a:endParaRPr lang="en-US"/>
           </a:p>
@@ -828,7 +828,7 @@
           <a:p>
             <a:fld id="{6F146A8E-1171-4935-B627-E6ABE4D502B8}" type="datetimeFigureOut">
               <a:rPr lang="en-US" smtClean="0"/>
-              <a:t>5/12/2020</a:t>
+              <a:t>5/14/2020</a:t>
             </a:fld>
             <a:endParaRPr lang="en-US"/>
           </a:p>
@@ -1074,7 +1074,7 @@
           <a:p>
             <a:fld id="{6F146A8E-1171-4935-B627-E6ABE4D502B8}" type="datetimeFigureOut">
               <a:rPr lang="en-US" smtClean="0"/>
-              <a:t>5/12/2020</a:t>
+              <a:t>5/14/2020</a:t>
             </a:fld>
             <a:endParaRPr lang="en-US"/>
           </a:p>
@@ -1362,7 +1362,7 @@
           <a:p>
             <a:fld id="{6F146A8E-1171-4935-B627-E6ABE4D502B8}" type="datetimeFigureOut">
               <a:rPr lang="en-US" smtClean="0"/>
-              <a:t>5/12/2020</a:t>
+              <a:t>5/14/2020</a:t>
             </a:fld>
             <a:endParaRPr lang="en-US"/>
           </a:p>
@@ -1784,7 +1784,7 @@
           <a:p>
             <a:fld id="{6F146A8E-1171-4935-B627-E6ABE4D502B8}" type="datetimeFigureOut">
               <a:rPr lang="en-US" smtClean="0"/>
-              <a:t>5/12/2020</a:t>
+              <a:t>5/14/2020</a:t>
             </a:fld>
             <a:endParaRPr lang="en-US"/>
           </a:p>
@@ -1902,7 +1902,7 @@
           <a:p>
             <a:fld id="{6F146A8E-1171-4935-B627-E6ABE4D502B8}" type="datetimeFigureOut">
               <a:rPr lang="en-US" smtClean="0"/>
-              <a:t>5/12/2020</a:t>
+              <a:t>5/14/2020</a:t>
             </a:fld>
             <a:endParaRPr lang="en-US"/>
           </a:p>
@@ -1997,7 +1997,7 @@
           <a:p>
             <a:fld id="{6F146A8E-1171-4935-B627-E6ABE4D502B8}" type="datetimeFigureOut">
               <a:rPr lang="en-US" smtClean="0"/>
-              <a:t>5/12/2020</a:t>
+              <a:t>5/14/2020</a:t>
             </a:fld>
             <a:endParaRPr lang="en-US"/>
           </a:p>
@@ -2274,7 +2274,7 @@
           <a:p>
             <a:fld id="{6F146A8E-1171-4935-B627-E6ABE4D502B8}" type="datetimeFigureOut">
               <a:rPr lang="en-US" smtClean="0"/>
-              <a:t>5/12/2020</a:t>
+              <a:t>5/14/2020</a:t>
             </a:fld>
             <a:endParaRPr lang="en-US"/>
           </a:p>
@@ -2527,7 +2527,7 @@
           <a:p>
             <a:fld id="{6F146A8E-1171-4935-B627-E6ABE4D502B8}" type="datetimeFigureOut">
               <a:rPr lang="en-US" smtClean="0"/>
-              <a:t>5/12/2020</a:t>
+              <a:t>5/14/2020</a:t>
             </a:fld>
             <a:endParaRPr lang="en-US"/>
           </a:p>
@@ -2740,7 +2740,7 @@
           <a:p>
             <a:fld id="{6F146A8E-1171-4935-B627-E6ABE4D502B8}" type="datetimeFigureOut">
               <a:rPr lang="en-US" smtClean="0"/>
-              <a:t>5/12/2020</a:t>
+              <a:t>5/14/2020</a:t>
             </a:fld>
             <a:endParaRPr lang="en-US"/>
           </a:p>
@@ -5139,7 +5139,13 @@
               <a:rPr lang="en-US" sz="2800" dirty="0" smtClean="0">
                 <a:sym typeface="Symbol"/>
               </a:rPr>
-              <a:t> = 1.5, decay with state count</a:t>
+              <a:t> = 1.5, </a:t>
+            </a:r>
+            <a:r>
+              <a:rPr lang="en-US" sz="2800" dirty="0">
+                <a:sym typeface="Symbol"/>
+              </a:rPr>
+              <a:t>decay with state count for every FIRST VISIT.</a:t>
             </a:r>
             <a:endParaRPr lang="en-US" sz="2800" dirty="0"/>
           </a:p>
@@ -5416,7 +5422,13 @@
               <a:rPr lang="en-US" sz="2800" dirty="0" smtClean="0">
                 <a:sym typeface="Symbol"/>
               </a:rPr>
-              <a:t> = 2, decay with state count</a:t>
+              <a:t> = 2, decay with state </a:t>
+            </a:r>
+            <a:r>
+              <a:rPr lang="en-US" sz="2800" dirty="0" smtClean="0">
+                <a:sym typeface="Symbol"/>
+              </a:rPr>
+              <a:t>count for every FIRST VISIT.</a:t>
             </a:r>
             <a:endParaRPr lang="en-US" sz="2800" dirty="0"/>
           </a:p>

</xml_diff>

<commit_message>
Improved information shown when debugging a simulation; results of first-visit update of alpha and TD(1) vs MC
</commit_message>
<xml_diff>
--- a/RL-001-MemoryManagement/results/202004Apr17-TestsTDLambdaMCLamba-1DGridworld.pptx
+++ b/RL-001-MemoryManagement/results/202004Apr17-TestsTDLambdaMCLamba-1DGridworld.pptx
@@ -26,6 +26,8 @@
     <p:sldId id="271" r:id="rId20"/>
     <p:sldId id="275" r:id="rId21"/>
     <p:sldId id="276" r:id="rId22"/>
+    <p:sldId id="277" r:id="rId23"/>
+    <p:sldId id="278" r:id="rId24"/>
   </p:sldIdLst>
   <p:sldSz cx="9144000" cy="6858000" type="screen4x3"/>
   <p:notesSz cx="6858000" cy="9144000"/>
@@ -308,7 +310,7 @@
           <a:p>
             <a:fld id="{6F146A8E-1171-4935-B627-E6ABE4D502B8}" type="datetimeFigureOut">
               <a:rPr lang="en-US" smtClean="0"/>
-              <a:t>5/14/2020</a:t>
+              <a:t>5/24/2020</a:t>
             </a:fld>
             <a:endParaRPr lang="en-US"/>
           </a:p>
@@ -478,7 +480,7 @@
           <a:p>
             <a:fld id="{6F146A8E-1171-4935-B627-E6ABE4D502B8}" type="datetimeFigureOut">
               <a:rPr lang="en-US" smtClean="0"/>
-              <a:t>5/14/2020</a:t>
+              <a:t>5/24/2020</a:t>
             </a:fld>
             <a:endParaRPr lang="en-US"/>
           </a:p>
@@ -658,7 +660,7 @@
           <a:p>
             <a:fld id="{6F146A8E-1171-4935-B627-E6ABE4D502B8}" type="datetimeFigureOut">
               <a:rPr lang="en-US" smtClean="0"/>
-              <a:t>5/14/2020</a:t>
+              <a:t>5/24/2020</a:t>
             </a:fld>
             <a:endParaRPr lang="en-US"/>
           </a:p>
@@ -828,7 +830,7 @@
           <a:p>
             <a:fld id="{6F146A8E-1171-4935-B627-E6ABE4D502B8}" type="datetimeFigureOut">
               <a:rPr lang="en-US" smtClean="0"/>
-              <a:t>5/14/2020</a:t>
+              <a:t>5/24/2020</a:t>
             </a:fld>
             <a:endParaRPr lang="en-US"/>
           </a:p>
@@ -1074,7 +1076,7 @@
           <a:p>
             <a:fld id="{6F146A8E-1171-4935-B627-E6ABE4D502B8}" type="datetimeFigureOut">
               <a:rPr lang="en-US" smtClean="0"/>
-              <a:t>5/14/2020</a:t>
+              <a:t>5/24/2020</a:t>
             </a:fld>
             <a:endParaRPr lang="en-US"/>
           </a:p>
@@ -1362,7 +1364,7 @@
           <a:p>
             <a:fld id="{6F146A8E-1171-4935-B627-E6ABE4D502B8}" type="datetimeFigureOut">
               <a:rPr lang="en-US" smtClean="0"/>
-              <a:t>5/14/2020</a:t>
+              <a:t>5/24/2020</a:t>
             </a:fld>
             <a:endParaRPr lang="en-US"/>
           </a:p>
@@ -1784,7 +1786,7 @@
           <a:p>
             <a:fld id="{6F146A8E-1171-4935-B627-E6ABE4D502B8}" type="datetimeFigureOut">
               <a:rPr lang="en-US" smtClean="0"/>
-              <a:t>5/14/2020</a:t>
+              <a:t>5/24/2020</a:t>
             </a:fld>
             <a:endParaRPr lang="en-US"/>
           </a:p>
@@ -1902,7 +1904,7 @@
           <a:p>
             <a:fld id="{6F146A8E-1171-4935-B627-E6ABE4D502B8}" type="datetimeFigureOut">
               <a:rPr lang="en-US" smtClean="0"/>
-              <a:t>5/14/2020</a:t>
+              <a:t>5/24/2020</a:t>
             </a:fld>
             <a:endParaRPr lang="en-US"/>
           </a:p>
@@ -1997,7 +1999,7 @@
           <a:p>
             <a:fld id="{6F146A8E-1171-4935-B627-E6ABE4D502B8}" type="datetimeFigureOut">
               <a:rPr lang="en-US" smtClean="0"/>
-              <a:t>5/14/2020</a:t>
+              <a:t>5/24/2020</a:t>
             </a:fld>
             <a:endParaRPr lang="en-US"/>
           </a:p>
@@ -2274,7 +2276,7 @@
           <a:p>
             <a:fld id="{6F146A8E-1171-4935-B627-E6ABE4D502B8}" type="datetimeFigureOut">
               <a:rPr lang="en-US" smtClean="0"/>
-              <a:t>5/14/2020</a:t>
+              <a:t>5/24/2020</a:t>
             </a:fld>
             <a:endParaRPr lang="en-US"/>
           </a:p>
@@ -2527,7 +2529,7 @@
           <a:p>
             <a:fld id="{6F146A8E-1171-4935-B627-E6ABE4D502B8}" type="datetimeFigureOut">
               <a:rPr lang="en-US" smtClean="0"/>
-              <a:t>5/14/2020</a:t>
+              <a:t>5/24/2020</a:t>
             </a:fld>
             <a:endParaRPr lang="en-US"/>
           </a:p>
@@ -2740,7 +2742,7 @@
           <a:p>
             <a:fld id="{6F146A8E-1171-4935-B627-E6ABE4D502B8}" type="datetimeFigureOut">
               <a:rPr lang="en-US" smtClean="0"/>
-              <a:t>5/14/2020</a:t>
+              <a:t>5/24/2020</a:t>
             </a:fld>
             <a:endParaRPr lang="en-US"/>
           </a:p>
@@ -5422,13 +5424,7 @@
               <a:rPr lang="en-US" sz="2800" dirty="0" smtClean="0">
                 <a:sym typeface="Symbol"/>
               </a:rPr>
-              <a:t> = 2, decay with state </a:t>
-            </a:r>
-            <a:r>
-              <a:rPr lang="en-US" sz="2800" dirty="0" smtClean="0">
-                <a:sym typeface="Symbol"/>
-              </a:rPr>
-              <a:t>count for every FIRST VISIT.</a:t>
+              <a:t> = 2, decay with state count for every FIRST VISIT.</a:t>
             </a:r>
             <a:endParaRPr lang="en-US" sz="2800" dirty="0"/>
           </a:p>
@@ -5600,6 +5596,756 @@
     <p:extLst>
       <p:ext uri="{BB962C8B-B14F-4D97-AF65-F5344CB8AC3E}">
         <p14:creationId xmlns:p14="http://schemas.microsoft.com/office/powerpoint/2010/main" val="4105996571"/>
+      </p:ext>
+    </p:extLst>
+  </p:cSld>
+  <p:clrMapOvr>
+    <a:masterClrMapping/>
+  </p:clrMapOvr>
+</p:sld>
+</file>
+
+<file path=ppt/slides/slide22.xml><?xml version="1.0" encoding="utf-8"?>
+<p:sld xmlns:a="http://schemas.openxmlformats.org/drawingml/2006/main" xmlns:r="http://schemas.openxmlformats.org/officeDocument/2006/relationships" xmlns:p="http://schemas.openxmlformats.org/presentationml/2006/main">
+  <p:cSld>
+    <p:spTree>
+      <p:nvGrpSpPr>
+        <p:cNvPr id="1" name=""/>
+        <p:cNvGrpSpPr/>
+        <p:nvPr/>
+      </p:nvGrpSpPr>
+      <p:grpSpPr>
+        <a:xfrm>
+          <a:off x="0" y="0"/>
+          <a:ext cx="0" cy="0"/>
+          <a:chOff x="0" y="0"/>
+          <a:chExt cx="0" cy="0"/>
+        </a:xfrm>
+      </p:grpSpPr>
+      <p:sp>
+        <p:nvSpPr>
+          <p:cNvPr id="2" name="Title 1"/>
+          <p:cNvSpPr>
+            <a:spLocks noGrp="1"/>
+          </p:cNvSpPr>
+          <p:nvPr>
+            <p:ph type="title"/>
+          </p:nvPr>
+        </p:nvSpPr>
+        <p:spPr/>
+        <p:txBody>
+          <a:bodyPr>
+            <a:normAutofit fontScale="90000"/>
+          </a:bodyPr>
+          <a:lstStyle/>
+          <a:p>
+            <a:r>
+              <a:rPr lang="en-US" dirty="0" smtClean="0"/>
+              <a:t>Comparison between TD(1) and MC</a:t>
+            </a:r>
+            <a:br>
+              <a:rPr lang="en-US" dirty="0" smtClean="0"/>
+            </a:br>
+            <a:r>
+              <a:rPr lang="en-US" dirty="0" smtClean="0">
+                <a:sym typeface="Symbol"/>
+              </a:rPr>
+              <a:t> = 1,  = 1,  = 1 </a:t>
+            </a:r>
+            <a:r>
+              <a:rPr lang="en-US" sz="3100" dirty="0" smtClean="0">
+                <a:sym typeface="Symbol"/>
+              </a:rPr>
+              <a:t>(seed = 1717, start = 10)</a:t>
+            </a:r>
+            <a:endParaRPr lang="en-US" dirty="0"/>
+          </a:p>
+        </p:txBody>
+      </p:sp>
+      <p:pic>
+        <p:nvPicPr>
+          <p:cNvPr id="1026" name="Picture 2"/>
+          <p:cNvPicPr>
+            <a:picLocks noChangeAspect="1" noChangeArrowheads="1"/>
+          </p:cNvPicPr>
+          <p:nvPr/>
+        </p:nvPicPr>
+        <p:blipFill rotWithShape="1">
+          <a:blip r:embed="rId2">
+            <a:extLst>
+              <a:ext uri="{28A0092B-C50C-407E-A947-70E740481C1C}">
+                <a14:useLocalDpi xmlns:a14="http://schemas.microsoft.com/office/drawing/2010/main" val="0"/>
+              </a:ext>
+            </a:extLst>
+          </a:blip>
+          <a:srcRect t="2840" r="1217" b="4188"/>
+          <a:stretch/>
+        </p:blipFill>
+        <p:spPr bwMode="auto">
+          <a:xfrm>
+            <a:off x="361950" y="2163305"/>
+            <a:ext cx="8317593" cy="3497943"/>
+          </a:xfrm>
+          <a:prstGeom prst="rect">
+            <a:avLst/>
+          </a:prstGeom>
+          <a:noFill/>
+          <a:ln>
+            <a:noFill/>
+          </a:ln>
+          <a:extLst>
+            <a:ext uri="{909E8E84-426E-40DD-AFC4-6F175D3DCCD1}">
+              <a14:hiddenFill xmlns:a14="http://schemas.microsoft.com/office/drawing/2010/main">
+                <a:solidFill>
+                  <a:schemeClr val="accent1"/>
+                </a:solidFill>
+              </a14:hiddenFill>
+            </a:ext>
+            <a:ext uri="{91240B29-F687-4F45-9708-019B960494DF}">
+              <a14:hiddenLine xmlns:a14="http://schemas.microsoft.com/office/drawing/2010/main" w="9525">
+                <a:solidFill>
+                  <a:schemeClr val="tx1"/>
+                </a:solidFill>
+                <a:miter lim="800000"/>
+                <a:headEnd/>
+                <a:tailEnd/>
+              </a14:hiddenLine>
+            </a:ext>
+          </a:extLst>
+        </p:spPr>
+      </p:pic>
+      <p:sp>
+        <p:nvSpPr>
+          <p:cNvPr id="4" name="TextBox 3"/>
+          <p:cNvSpPr txBox="1"/>
+          <p:nvPr/>
+        </p:nvSpPr>
+        <p:spPr>
+          <a:xfrm>
+            <a:off x="383847" y="6237312"/>
+            <a:ext cx="7188956" cy="523220"/>
+          </a:xfrm>
+          <a:prstGeom prst="rect">
+            <a:avLst/>
+          </a:prstGeom>
+          <a:noFill/>
+        </p:spPr>
+        <p:txBody>
+          <a:bodyPr wrap="none" rtlCol="0">
+            <a:spAutoFit/>
+          </a:bodyPr>
+          <a:lstStyle/>
+          <a:p>
+            <a:r>
+              <a:rPr lang="en-US" sz="1400" dirty="0" smtClean="0"/>
+              <a:t>(*) This is </a:t>
+            </a:r>
+            <a:r>
+              <a:rPr lang="en-US" sz="1400" b="1" dirty="0" smtClean="0"/>
+              <a:t>like update by EPISODE </a:t>
+            </a:r>
+            <a:r>
+              <a:rPr lang="en-US" sz="1400" dirty="0" smtClean="0"/>
+              <a:t>but </a:t>
+            </a:r>
+            <a:r>
+              <a:rPr lang="en-US" sz="1400" b="1" dirty="0" smtClean="0">
+                <a:sym typeface="Symbol"/>
+              </a:rPr>
+              <a:t> is NOT updated in an episode if the state is NOT visited</a:t>
+            </a:r>
+          </a:p>
+          <a:p>
+            <a:r>
+              <a:rPr lang="en-US" sz="1400" dirty="0" smtClean="0">
+                <a:sym typeface="Symbol"/>
+              </a:rPr>
+              <a:t>Ref: test_TD_lambda.py, test_MC_lambda.py</a:t>
+            </a:r>
+            <a:endParaRPr lang="en-US" sz="1400" dirty="0"/>
+          </a:p>
+        </p:txBody>
+      </p:sp>
+      <p:pic>
+        <p:nvPicPr>
+          <p:cNvPr id="1028" name="Picture 4"/>
+          <p:cNvPicPr>
+            <a:picLocks noChangeAspect="1" noChangeArrowheads="1"/>
+          </p:cNvPicPr>
+          <p:nvPr/>
+        </p:nvPicPr>
+        <p:blipFill>
+          <a:blip r:embed="rId3">
+            <a:extLst>
+              <a:ext uri="{28A0092B-C50C-407E-A947-70E740481C1C}">
+                <a14:useLocalDpi xmlns:a14="http://schemas.microsoft.com/office/drawing/2010/main" val="0"/>
+              </a:ext>
+            </a:extLst>
+          </a:blip>
+          <a:srcRect/>
+          <a:stretch>
+            <a:fillRect/>
+          </a:stretch>
+        </p:blipFill>
+        <p:spPr bwMode="auto">
+          <a:xfrm>
+            <a:off x="2661970" y="4581273"/>
+            <a:ext cx="3717551" cy="1656039"/>
+          </a:xfrm>
+          <a:prstGeom prst="rect">
+            <a:avLst/>
+          </a:prstGeom>
+          <a:noFill/>
+          <a:ln>
+            <a:noFill/>
+          </a:ln>
+          <a:extLst>
+            <a:ext uri="{909E8E84-426E-40DD-AFC4-6F175D3DCCD1}">
+              <a14:hiddenFill xmlns:a14="http://schemas.microsoft.com/office/drawing/2010/main">
+                <a:solidFill>
+                  <a:schemeClr val="accent1"/>
+                </a:solidFill>
+              </a14:hiddenFill>
+            </a:ext>
+            <a:ext uri="{91240B29-F687-4F45-9708-019B960494DF}">
+              <a14:hiddenLine xmlns:a14="http://schemas.microsoft.com/office/drawing/2010/main" w="9525">
+                <a:solidFill>
+                  <a:schemeClr val="tx1"/>
+                </a:solidFill>
+                <a:miter lim="800000"/>
+                <a:headEnd/>
+                <a:tailEnd/>
+              </a14:hiddenLine>
+            </a:ext>
+          </a:extLst>
+        </p:spPr>
+      </p:pic>
+      <p:sp>
+        <p:nvSpPr>
+          <p:cNvPr id="9" name="TextBox 8"/>
+          <p:cNvSpPr txBox="1"/>
+          <p:nvPr/>
+        </p:nvSpPr>
+        <p:spPr>
+          <a:xfrm>
+            <a:off x="2037049" y="1662399"/>
+            <a:ext cx="878767" cy="461665"/>
+          </a:xfrm>
+          <a:prstGeom prst="rect">
+            <a:avLst/>
+          </a:prstGeom>
+          <a:noFill/>
+        </p:spPr>
+        <p:txBody>
+          <a:bodyPr wrap="none" rtlCol="0">
+            <a:spAutoFit/>
+          </a:bodyPr>
+          <a:lstStyle/>
+          <a:p>
+            <a:r>
+              <a:rPr lang="en-US" sz="2400" b="1" dirty="0" smtClean="0"/>
+              <a:t>TD(1)</a:t>
+            </a:r>
+            <a:endParaRPr lang="en-US" sz="2400" b="1" dirty="0"/>
+          </a:p>
+        </p:txBody>
+      </p:sp>
+      <p:sp>
+        <p:nvSpPr>
+          <p:cNvPr id="10" name="TextBox 9"/>
+          <p:cNvSpPr txBox="1"/>
+          <p:nvPr/>
+        </p:nvSpPr>
+        <p:spPr>
+          <a:xfrm>
+            <a:off x="5607062" y="1671191"/>
+            <a:ext cx="2005806" cy="461665"/>
+          </a:xfrm>
+          <a:prstGeom prst="rect">
+            <a:avLst/>
+          </a:prstGeom>
+          <a:noFill/>
+        </p:spPr>
+        <p:txBody>
+          <a:bodyPr wrap="none" rtlCol="0">
+            <a:spAutoFit/>
+          </a:bodyPr>
+          <a:lstStyle/>
+          <a:p>
+            <a:r>
+              <a:rPr lang="en-US" sz="2400" b="1" dirty="0" smtClean="0"/>
+              <a:t>Every-visit MC</a:t>
+            </a:r>
+            <a:endParaRPr lang="en-US" sz="2400" b="1" dirty="0"/>
+          </a:p>
+        </p:txBody>
+      </p:sp>
+      <p:sp>
+        <p:nvSpPr>
+          <p:cNvPr id="11" name="TextBox 10"/>
+          <p:cNvSpPr txBox="1"/>
+          <p:nvPr/>
+        </p:nvSpPr>
+        <p:spPr>
+          <a:xfrm>
+            <a:off x="2915816" y="1403484"/>
+            <a:ext cx="3878369" cy="369332"/>
+          </a:xfrm>
+          <a:prstGeom prst="rect">
+            <a:avLst/>
+          </a:prstGeom>
+          <a:solidFill>
+            <a:srgbClr val="FFFF00"/>
+          </a:solidFill>
+        </p:spPr>
+        <p:txBody>
+          <a:bodyPr wrap="none" rtlCol="0">
+            <a:spAutoFit/>
+          </a:bodyPr>
+          <a:lstStyle/>
+          <a:p>
+            <a:r>
+              <a:rPr lang="en-US" b="1" dirty="0" smtClean="0">
+                <a:sym typeface="Symbol"/>
+              </a:rPr>
+              <a:t> updated by FIRST-VISIT state count</a:t>
+            </a:r>
+            <a:r>
+              <a:rPr lang="en-US" b="1" baseline="30000" dirty="0" smtClean="0">
+                <a:sym typeface="Symbol"/>
+              </a:rPr>
+              <a:t>(*)</a:t>
+            </a:r>
+            <a:endParaRPr lang="en-US" b="1" baseline="30000" dirty="0"/>
+          </a:p>
+        </p:txBody>
+      </p:sp>
+    </p:spTree>
+    <p:extLst>
+      <p:ext uri="{BB962C8B-B14F-4D97-AF65-F5344CB8AC3E}">
+        <p14:creationId xmlns:p14="http://schemas.microsoft.com/office/powerpoint/2010/main" val="2006620913"/>
+      </p:ext>
+    </p:extLst>
+  </p:cSld>
+  <p:clrMapOvr>
+    <a:masterClrMapping/>
+  </p:clrMapOvr>
+</p:sld>
+</file>
+
+<file path=ppt/slides/slide23.xml><?xml version="1.0" encoding="utf-8"?>
+<p:sld xmlns:a="http://schemas.openxmlformats.org/drawingml/2006/main" xmlns:r="http://schemas.openxmlformats.org/officeDocument/2006/relationships" xmlns:p="http://schemas.openxmlformats.org/presentationml/2006/main">
+  <p:cSld>
+    <p:spTree>
+      <p:nvGrpSpPr>
+        <p:cNvPr id="1" name=""/>
+        <p:cNvGrpSpPr/>
+        <p:nvPr/>
+      </p:nvGrpSpPr>
+      <p:grpSpPr>
+        <a:xfrm>
+          <a:off x="0" y="0"/>
+          <a:ext cx="0" cy="0"/>
+          <a:chOff x="0" y="0"/>
+          <a:chExt cx="0" cy="0"/>
+        </a:xfrm>
+      </p:grpSpPr>
+      <p:sp>
+        <p:nvSpPr>
+          <p:cNvPr id="2" name="Title 1"/>
+          <p:cNvSpPr>
+            <a:spLocks noGrp="1"/>
+          </p:cNvSpPr>
+          <p:nvPr>
+            <p:ph type="title"/>
+          </p:nvPr>
+        </p:nvSpPr>
+        <p:spPr/>
+        <p:txBody>
+          <a:bodyPr>
+            <a:normAutofit fontScale="90000"/>
+          </a:bodyPr>
+          <a:lstStyle/>
+          <a:p>
+            <a:r>
+              <a:rPr lang="en-US" dirty="0" smtClean="0"/>
+              <a:t>MC first-visit vs. every-visit</a:t>
+            </a:r>
+            <a:br>
+              <a:rPr lang="en-US" dirty="0" smtClean="0"/>
+            </a:br>
+            <a:r>
+              <a:rPr lang="en-US" dirty="0">
+                <a:sym typeface="Symbol"/>
+              </a:rPr>
+              <a:t> = 1</a:t>
+            </a:r>
+            <a:r>
+              <a:rPr lang="en-US" dirty="0" smtClean="0">
+                <a:sym typeface="Symbol"/>
+              </a:rPr>
+              <a:t>,  </a:t>
+            </a:r>
+            <a:r>
+              <a:rPr lang="en-US" dirty="0">
+                <a:sym typeface="Symbol"/>
+              </a:rPr>
+              <a:t>= 1 </a:t>
+            </a:r>
+            <a:r>
+              <a:rPr lang="en-US" sz="3100" dirty="0">
+                <a:sym typeface="Symbol"/>
+              </a:rPr>
+              <a:t>(seed = 1717, start = 10)</a:t>
+            </a:r>
+            <a:endParaRPr lang="en-US" dirty="0"/>
+          </a:p>
+        </p:txBody>
+      </p:sp>
+      <p:grpSp>
+        <p:nvGrpSpPr>
+          <p:cNvPr id="4" name="Group 3"/>
+          <p:cNvGrpSpPr/>
+          <p:nvPr/>
+        </p:nvGrpSpPr>
+        <p:grpSpPr>
+          <a:xfrm>
+            <a:off x="791952" y="2132856"/>
+            <a:ext cx="3348000" cy="4608512"/>
+            <a:chOff x="438150" y="1573592"/>
+            <a:chExt cx="4133850" cy="7353300"/>
+          </a:xfrm>
+        </p:grpSpPr>
+        <p:pic>
+          <p:nvPicPr>
+            <p:cNvPr id="2051" name="Picture 3"/>
+            <p:cNvPicPr>
+              <a:picLocks noChangeAspect="1" noChangeArrowheads="1"/>
+            </p:cNvPicPr>
+            <p:nvPr/>
+          </p:nvPicPr>
+          <p:blipFill>
+            <a:blip r:embed="rId2">
+              <a:extLst>
+                <a:ext uri="{28A0092B-C50C-407E-A947-70E740481C1C}">
+                  <a14:useLocalDpi xmlns:a14="http://schemas.microsoft.com/office/drawing/2010/main" val="0"/>
+                </a:ext>
+              </a:extLst>
+            </a:blip>
+            <a:srcRect/>
+            <a:stretch>
+              <a:fillRect/>
+            </a:stretch>
+          </p:blipFill>
+          <p:spPr bwMode="auto">
+            <a:xfrm>
+              <a:off x="438150" y="1573592"/>
+              <a:ext cx="4133850" cy="3676650"/>
+            </a:xfrm>
+            <a:prstGeom prst="rect">
+              <a:avLst/>
+            </a:prstGeom>
+            <a:noFill/>
+            <a:ln>
+              <a:noFill/>
+            </a:ln>
+            <a:extLst>
+              <a:ext uri="{909E8E84-426E-40DD-AFC4-6F175D3DCCD1}">
+                <a14:hiddenFill xmlns:a14="http://schemas.microsoft.com/office/drawing/2010/main">
+                  <a:solidFill>
+                    <a:schemeClr val="accent1"/>
+                  </a:solidFill>
+                </a14:hiddenFill>
+              </a:ext>
+              <a:ext uri="{91240B29-F687-4F45-9708-019B960494DF}">
+                <a14:hiddenLine xmlns:a14="http://schemas.microsoft.com/office/drawing/2010/main" w="9525">
+                  <a:solidFill>
+                    <a:schemeClr val="tx1"/>
+                  </a:solidFill>
+                  <a:miter lim="800000"/>
+                  <a:headEnd/>
+                  <a:tailEnd/>
+                </a14:hiddenLine>
+              </a:ext>
+            </a:extLst>
+          </p:spPr>
+        </p:pic>
+        <p:pic>
+          <p:nvPicPr>
+            <p:cNvPr id="2053" name="Picture 5"/>
+            <p:cNvPicPr>
+              <a:picLocks noChangeAspect="1" noChangeArrowheads="1"/>
+            </p:cNvPicPr>
+            <p:nvPr/>
+          </p:nvPicPr>
+          <p:blipFill>
+            <a:blip r:embed="rId3">
+              <a:extLst>
+                <a:ext uri="{28A0092B-C50C-407E-A947-70E740481C1C}">
+                  <a14:useLocalDpi xmlns:a14="http://schemas.microsoft.com/office/drawing/2010/main" val="0"/>
+                </a:ext>
+              </a:extLst>
+            </a:blip>
+            <a:srcRect/>
+            <a:stretch>
+              <a:fillRect/>
+            </a:stretch>
+          </p:blipFill>
+          <p:spPr bwMode="auto">
+            <a:xfrm>
+              <a:off x="438150" y="5250242"/>
+              <a:ext cx="4133850" cy="3676650"/>
+            </a:xfrm>
+            <a:prstGeom prst="rect">
+              <a:avLst/>
+            </a:prstGeom>
+            <a:noFill/>
+            <a:ln>
+              <a:noFill/>
+            </a:ln>
+            <a:extLst>
+              <a:ext uri="{909E8E84-426E-40DD-AFC4-6F175D3DCCD1}">
+                <a14:hiddenFill xmlns:a14="http://schemas.microsoft.com/office/drawing/2010/main">
+                  <a:solidFill>
+                    <a:schemeClr val="accent1"/>
+                  </a:solidFill>
+                </a14:hiddenFill>
+              </a:ext>
+              <a:ext uri="{91240B29-F687-4F45-9708-019B960494DF}">
+                <a14:hiddenLine xmlns:a14="http://schemas.microsoft.com/office/drawing/2010/main" w="9525">
+                  <a:solidFill>
+                    <a:schemeClr val="tx1"/>
+                  </a:solidFill>
+                  <a:miter lim="800000"/>
+                  <a:headEnd/>
+                  <a:tailEnd/>
+                </a14:hiddenLine>
+              </a:ext>
+            </a:extLst>
+          </p:spPr>
+        </p:pic>
+      </p:grpSp>
+      <p:grpSp>
+        <p:nvGrpSpPr>
+          <p:cNvPr id="5" name="Group 4"/>
+          <p:cNvGrpSpPr/>
+          <p:nvPr/>
+        </p:nvGrpSpPr>
+        <p:grpSpPr>
+          <a:xfrm>
+            <a:off x="4860032" y="2205376"/>
+            <a:ext cx="3348000" cy="4608000"/>
+            <a:chOff x="4716016" y="1571306"/>
+            <a:chExt cx="4138087" cy="7362326"/>
+          </a:xfrm>
+        </p:grpSpPr>
+        <p:pic>
+          <p:nvPicPr>
+            <p:cNvPr id="2052" name="Picture 4"/>
+            <p:cNvPicPr>
+              <a:picLocks noChangeAspect="1" noChangeArrowheads="1"/>
+            </p:cNvPicPr>
+            <p:nvPr/>
+          </p:nvPicPr>
+          <p:blipFill>
+            <a:blip r:embed="rId4">
+              <a:extLst>
+                <a:ext uri="{28A0092B-C50C-407E-A947-70E740481C1C}">
+                  <a14:useLocalDpi xmlns:a14="http://schemas.microsoft.com/office/drawing/2010/main" val="0"/>
+                </a:ext>
+              </a:extLst>
+            </a:blip>
+            <a:srcRect/>
+            <a:stretch>
+              <a:fillRect/>
+            </a:stretch>
+          </p:blipFill>
+          <p:spPr bwMode="auto">
+            <a:xfrm>
+              <a:off x="4720253" y="1571306"/>
+              <a:ext cx="4133850" cy="3676650"/>
+            </a:xfrm>
+            <a:prstGeom prst="rect">
+              <a:avLst/>
+            </a:prstGeom>
+            <a:noFill/>
+            <a:ln>
+              <a:noFill/>
+            </a:ln>
+            <a:extLst>
+              <a:ext uri="{909E8E84-426E-40DD-AFC4-6F175D3DCCD1}">
+                <a14:hiddenFill xmlns:a14="http://schemas.microsoft.com/office/drawing/2010/main">
+                  <a:solidFill>
+                    <a:schemeClr val="accent1"/>
+                  </a:solidFill>
+                </a14:hiddenFill>
+              </a:ext>
+              <a:ext uri="{91240B29-F687-4F45-9708-019B960494DF}">
+                <a14:hiddenLine xmlns:a14="http://schemas.microsoft.com/office/drawing/2010/main" w="9525">
+                  <a:solidFill>
+                    <a:schemeClr val="tx1"/>
+                  </a:solidFill>
+                  <a:miter lim="800000"/>
+                  <a:headEnd/>
+                  <a:tailEnd/>
+                </a14:hiddenLine>
+              </a:ext>
+            </a:extLst>
+          </p:spPr>
+        </p:pic>
+        <p:pic>
+          <p:nvPicPr>
+            <p:cNvPr id="2054" name="Picture 6"/>
+            <p:cNvPicPr>
+              <a:picLocks noChangeAspect="1" noChangeArrowheads="1"/>
+            </p:cNvPicPr>
+            <p:nvPr/>
+          </p:nvPicPr>
+          <p:blipFill>
+            <a:blip r:embed="rId5">
+              <a:extLst>
+                <a:ext uri="{28A0092B-C50C-407E-A947-70E740481C1C}">
+                  <a14:useLocalDpi xmlns:a14="http://schemas.microsoft.com/office/drawing/2010/main" val="0"/>
+                </a:ext>
+              </a:extLst>
+            </a:blip>
+            <a:srcRect/>
+            <a:stretch>
+              <a:fillRect/>
+            </a:stretch>
+          </p:blipFill>
+          <p:spPr bwMode="auto">
+            <a:xfrm>
+              <a:off x="4716016" y="5256982"/>
+              <a:ext cx="4133850" cy="3676650"/>
+            </a:xfrm>
+            <a:prstGeom prst="rect">
+              <a:avLst/>
+            </a:prstGeom>
+            <a:noFill/>
+            <a:ln>
+              <a:noFill/>
+            </a:ln>
+            <a:extLst>
+              <a:ext uri="{909E8E84-426E-40DD-AFC4-6F175D3DCCD1}">
+                <a14:hiddenFill xmlns:a14="http://schemas.microsoft.com/office/drawing/2010/main">
+                  <a:solidFill>
+                    <a:schemeClr val="accent1"/>
+                  </a:solidFill>
+                </a14:hiddenFill>
+              </a:ext>
+              <a:ext uri="{91240B29-F687-4F45-9708-019B960494DF}">
+                <a14:hiddenLine xmlns:a14="http://schemas.microsoft.com/office/drawing/2010/main" w="9525">
+                  <a:solidFill>
+                    <a:schemeClr val="tx1"/>
+                  </a:solidFill>
+                  <a:miter lim="800000"/>
+                  <a:headEnd/>
+                  <a:tailEnd/>
+                </a14:hiddenLine>
+              </a:ext>
+            </a:extLst>
+          </p:spPr>
+        </p:pic>
+      </p:grpSp>
+      <p:sp>
+        <p:nvSpPr>
+          <p:cNvPr id="12" name="TextBox 11"/>
+          <p:cNvSpPr txBox="1"/>
+          <p:nvPr/>
+        </p:nvSpPr>
+        <p:spPr>
+          <a:xfrm>
+            <a:off x="1547664" y="1662399"/>
+            <a:ext cx="1857368" cy="461665"/>
+          </a:xfrm>
+          <a:prstGeom prst="rect">
+            <a:avLst/>
+          </a:prstGeom>
+          <a:noFill/>
+        </p:spPr>
+        <p:txBody>
+          <a:bodyPr wrap="none" rtlCol="0">
+            <a:spAutoFit/>
+          </a:bodyPr>
+          <a:lstStyle/>
+          <a:p>
+            <a:r>
+              <a:rPr lang="en-US" sz="2400" b="1" dirty="0" smtClean="0"/>
+              <a:t>First-visit MC</a:t>
+            </a:r>
+            <a:endParaRPr lang="en-US" sz="2400" b="1" dirty="0"/>
+          </a:p>
+        </p:txBody>
+      </p:sp>
+      <p:sp>
+        <p:nvSpPr>
+          <p:cNvPr id="13" name="TextBox 12"/>
+          <p:cNvSpPr txBox="1"/>
+          <p:nvPr/>
+        </p:nvSpPr>
+        <p:spPr>
+          <a:xfrm>
+            <a:off x="5607062" y="1671191"/>
+            <a:ext cx="2005806" cy="461665"/>
+          </a:xfrm>
+          <a:prstGeom prst="rect">
+            <a:avLst/>
+          </a:prstGeom>
+          <a:noFill/>
+        </p:spPr>
+        <p:txBody>
+          <a:bodyPr wrap="none" rtlCol="0">
+            <a:spAutoFit/>
+          </a:bodyPr>
+          <a:lstStyle/>
+          <a:p>
+            <a:r>
+              <a:rPr lang="en-US" sz="2400" b="1" dirty="0" smtClean="0"/>
+              <a:t>Every-visit MC</a:t>
+            </a:r>
+            <a:endParaRPr lang="en-US" sz="2400" b="1" dirty="0"/>
+          </a:p>
+        </p:txBody>
+      </p:sp>
+      <p:sp>
+        <p:nvSpPr>
+          <p:cNvPr id="7" name="TextBox 6"/>
+          <p:cNvSpPr txBox="1"/>
+          <p:nvPr/>
+        </p:nvSpPr>
+        <p:spPr>
+          <a:xfrm>
+            <a:off x="2915816" y="1403484"/>
+            <a:ext cx="3705245" cy="369332"/>
+          </a:xfrm>
+          <a:prstGeom prst="rect">
+            <a:avLst/>
+          </a:prstGeom>
+          <a:solidFill>
+            <a:srgbClr val="FFFF00"/>
+          </a:solidFill>
+        </p:spPr>
+        <p:txBody>
+          <a:bodyPr wrap="none" rtlCol="0">
+            <a:spAutoFit/>
+          </a:bodyPr>
+          <a:lstStyle/>
+          <a:p>
+            <a:r>
+              <a:rPr lang="en-US" b="1" dirty="0" smtClean="0">
+                <a:sym typeface="Symbol"/>
+              </a:rPr>
+              <a:t> updated by FIRST-VISIT state count</a:t>
+            </a:r>
+            <a:endParaRPr lang="en-US" b="1" dirty="0"/>
+          </a:p>
+        </p:txBody>
+      </p:sp>
+    </p:spTree>
+    <p:extLst>
+      <p:ext uri="{BB962C8B-B14F-4D97-AF65-F5344CB8AC3E}">
+        <p14:creationId xmlns:p14="http://schemas.microsoft.com/office/powerpoint/2010/main" val="412792473"/>
       </p:ext>
     </p:extLst>
   </p:cSld>

</xml_diff>

<commit_message>
Track and plot of state-dependent lambda for Adaptive TD(lambda)
</commit_message>
<xml_diff>
--- a/RL-001-MemoryManagement/results/202004Apr17-TestsTDLambdaMCLamba-1DGridworld.pptx
+++ b/RL-001-MemoryManagement/results/202004Apr17-TestsTDLambdaMCLamba-1DGridworld.pptx
@@ -28,6 +28,7 @@
     <p:sldId id="276" r:id="rId22"/>
     <p:sldId id="277" r:id="rId23"/>
     <p:sldId id="278" r:id="rId24"/>
+    <p:sldId id="279" r:id="rId25"/>
   </p:sldIdLst>
   <p:sldSz cx="9144000" cy="6858000" type="screen4x3"/>
   <p:notesSz cx="6858000" cy="9144000"/>
@@ -5975,25 +5976,13 @@
               <a:rPr lang="en-US" dirty="0" smtClean="0"/>
             </a:br>
             <a:r>
-              <a:rPr lang="en-US" dirty="0">
-                <a:sym typeface="Symbol"/>
-              </a:rPr>
-              <a:t> = 1</a:t>
-            </a:r>
-            <a:r>
               <a:rPr lang="en-US" dirty="0" smtClean="0">
                 <a:sym typeface="Symbol"/>
               </a:rPr>
-              <a:t>,  </a:t>
-            </a:r>
-            <a:r>
-              <a:rPr lang="en-US" dirty="0">
-                <a:sym typeface="Symbol"/>
-              </a:rPr>
-              <a:t>= 1 </a:t>
-            </a:r>
-            <a:r>
-              <a:rPr lang="en-US" sz="3100" dirty="0">
+              <a:t> = 1,  = 1 </a:t>
+            </a:r>
+            <a:r>
+              <a:rPr lang="en-US" sz="3100" dirty="0" smtClean="0">
                 <a:sym typeface="Symbol"/>
               </a:rPr>
               <a:t>(seed = 1717, start = 10)</a:t>
@@ -6346,6 +6335,404 @@
     <p:extLst>
       <p:ext uri="{BB962C8B-B14F-4D97-AF65-F5344CB8AC3E}">
         <p14:creationId xmlns:p14="http://schemas.microsoft.com/office/powerpoint/2010/main" val="412792473"/>
+      </p:ext>
+    </p:extLst>
+  </p:cSld>
+  <p:clrMapOvr>
+    <a:masterClrMapping/>
+  </p:clrMapOvr>
+</p:sld>
+</file>
+
+<file path=ppt/slides/slide24.xml><?xml version="1.0" encoding="utf-8"?>
+<p:sld xmlns:a="http://schemas.openxmlformats.org/drawingml/2006/main" xmlns:r="http://schemas.openxmlformats.org/officeDocument/2006/relationships" xmlns:p="http://schemas.openxmlformats.org/presentationml/2006/main">
+  <p:cSld>
+    <p:spTree>
+      <p:nvGrpSpPr>
+        <p:cNvPr id="1" name=""/>
+        <p:cNvGrpSpPr/>
+        <p:nvPr/>
+      </p:nvGrpSpPr>
+      <p:grpSpPr>
+        <a:xfrm>
+          <a:off x="0" y="0"/>
+          <a:ext cx="0" cy="0"/>
+          <a:chOff x="0" y="0"/>
+          <a:chExt cx="0" cy="0"/>
+        </a:xfrm>
+      </p:grpSpPr>
+      <p:sp>
+        <p:nvSpPr>
+          <p:cNvPr id="2" name="Title 1"/>
+          <p:cNvSpPr>
+            <a:spLocks noGrp="1"/>
+          </p:cNvSpPr>
+          <p:nvPr>
+            <p:ph type="title"/>
+          </p:nvPr>
+        </p:nvSpPr>
+        <p:spPr/>
+        <p:txBody>
+          <a:bodyPr>
+            <a:normAutofit fontScale="90000"/>
+          </a:bodyPr>
+          <a:lstStyle/>
+          <a:p>
+            <a:r>
+              <a:rPr lang="en-US" dirty="0" smtClean="0"/>
+              <a:t>TD(</a:t>
+            </a:r>
+            <a:r>
+              <a:rPr lang="en-US" dirty="0" smtClean="0">
+                <a:sym typeface="Symbol"/>
+              </a:rPr>
+              <a:t>) first-visit -update</a:t>
+            </a:r>
+            <a:br>
+              <a:rPr lang="en-US" dirty="0" smtClean="0">
+                <a:sym typeface="Symbol"/>
+              </a:rPr>
+            </a:br>
+            <a:r>
+              <a:rPr lang="en-US" dirty="0">
+                <a:sym typeface="Symbol"/>
+              </a:rPr>
+              <a:t> = 1,  = </a:t>
+            </a:r>
+            <a:r>
+              <a:rPr lang="en-US" dirty="0" smtClean="0">
+                <a:sym typeface="Symbol"/>
+              </a:rPr>
+              <a:t>0.7, </a:t>
+            </a:r>
+            <a:r>
+              <a:rPr lang="en-US" dirty="0">
+                <a:sym typeface="Symbol"/>
+              </a:rPr>
+              <a:t> = 1 </a:t>
+            </a:r>
+            <a:r>
+              <a:rPr lang="en-US" sz="3100" dirty="0">
+                <a:sym typeface="Symbol"/>
+              </a:rPr>
+              <a:t>(seed = 1717, start = 10)</a:t>
+            </a:r>
+            <a:endParaRPr lang="en-US" dirty="0"/>
+          </a:p>
+        </p:txBody>
+      </p:sp>
+      <p:sp>
+        <p:nvSpPr>
+          <p:cNvPr id="3" name="Content Placeholder 2"/>
+          <p:cNvSpPr>
+            <a:spLocks noGrp="1"/>
+          </p:cNvSpPr>
+          <p:nvPr>
+            <p:ph idx="1"/>
+          </p:nvPr>
+        </p:nvSpPr>
+        <p:spPr/>
+        <p:txBody>
+          <a:bodyPr/>
+          <a:lstStyle/>
+          <a:p>
+            <a:pPr marL="0" indent="0">
+              <a:buNone/>
+            </a:pPr>
+            <a:endParaRPr lang="en-US" dirty="0"/>
+          </a:p>
+        </p:txBody>
+      </p:sp>
+      <p:pic>
+        <p:nvPicPr>
+          <p:cNvPr id="3074" name="Picture 2"/>
+          <p:cNvPicPr>
+            <a:picLocks noChangeAspect="1" noChangeArrowheads="1"/>
+          </p:cNvPicPr>
+          <p:nvPr/>
+        </p:nvPicPr>
+        <p:blipFill>
+          <a:blip r:embed="rId2">
+            <a:extLst>
+              <a:ext uri="{28A0092B-C50C-407E-A947-70E740481C1C}">
+                <a14:useLocalDpi xmlns:a14="http://schemas.microsoft.com/office/drawing/2010/main" val="0"/>
+              </a:ext>
+            </a:extLst>
+          </a:blip>
+          <a:srcRect/>
+          <a:stretch>
+            <a:fillRect/>
+          </a:stretch>
+        </p:blipFill>
+        <p:spPr bwMode="auto">
+          <a:xfrm>
+            <a:off x="4572000" y="2276872"/>
+            <a:ext cx="4133850" cy="3676650"/>
+          </a:xfrm>
+          <a:prstGeom prst="rect">
+            <a:avLst/>
+          </a:prstGeom>
+          <a:noFill/>
+          <a:ln>
+            <a:noFill/>
+          </a:ln>
+          <a:extLst>
+            <a:ext uri="{909E8E84-426E-40DD-AFC4-6F175D3DCCD1}">
+              <a14:hiddenFill xmlns:a14="http://schemas.microsoft.com/office/drawing/2010/main">
+                <a:solidFill>
+                  <a:schemeClr val="accent1"/>
+                </a:solidFill>
+              </a14:hiddenFill>
+            </a:ext>
+            <a:ext uri="{91240B29-F687-4F45-9708-019B960494DF}">
+              <a14:hiddenLine xmlns:a14="http://schemas.microsoft.com/office/drawing/2010/main" w="9525">
+                <a:solidFill>
+                  <a:schemeClr val="tx1"/>
+                </a:solidFill>
+                <a:miter lim="800000"/>
+                <a:headEnd/>
+                <a:tailEnd/>
+              </a14:hiddenLine>
+            </a:ext>
+          </a:extLst>
+        </p:spPr>
+      </p:pic>
+      <p:pic>
+        <p:nvPicPr>
+          <p:cNvPr id="3075" name="Picture 3"/>
+          <p:cNvPicPr>
+            <a:picLocks noChangeAspect="1" noChangeArrowheads="1"/>
+          </p:cNvPicPr>
+          <p:nvPr/>
+        </p:nvPicPr>
+        <p:blipFill>
+          <a:blip r:embed="rId3">
+            <a:extLst>
+              <a:ext uri="{28A0092B-C50C-407E-A947-70E740481C1C}">
+                <a14:useLocalDpi xmlns:a14="http://schemas.microsoft.com/office/drawing/2010/main" val="0"/>
+              </a:ext>
+            </a:extLst>
+          </a:blip>
+          <a:srcRect/>
+          <a:stretch>
+            <a:fillRect/>
+          </a:stretch>
+        </p:blipFill>
+        <p:spPr bwMode="auto">
+          <a:xfrm>
+            <a:off x="413629" y="2276872"/>
+            <a:ext cx="4133850" cy="3676650"/>
+          </a:xfrm>
+          <a:prstGeom prst="rect">
+            <a:avLst/>
+          </a:prstGeom>
+          <a:noFill/>
+          <a:ln>
+            <a:noFill/>
+          </a:ln>
+          <a:extLst>
+            <a:ext uri="{909E8E84-426E-40DD-AFC4-6F175D3DCCD1}">
+              <a14:hiddenFill xmlns:a14="http://schemas.microsoft.com/office/drawing/2010/main">
+                <a:solidFill>
+                  <a:schemeClr val="accent1"/>
+                </a:solidFill>
+              </a14:hiddenFill>
+            </a:ext>
+            <a:ext uri="{91240B29-F687-4F45-9708-019B960494DF}">
+              <a14:hiddenLine xmlns:a14="http://schemas.microsoft.com/office/drawing/2010/main" w="9525">
+                <a:solidFill>
+                  <a:schemeClr val="tx1"/>
+                </a:solidFill>
+                <a:miter lim="800000"/>
+                <a:headEnd/>
+                <a:tailEnd/>
+              </a14:hiddenLine>
+            </a:ext>
+          </a:extLst>
+        </p:spPr>
+      </p:pic>
+      <p:sp>
+        <p:nvSpPr>
+          <p:cNvPr id="6" name="TextBox 5"/>
+          <p:cNvSpPr txBox="1"/>
+          <p:nvPr/>
+        </p:nvSpPr>
+        <p:spPr>
+          <a:xfrm>
+            <a:off x="2915816" y="1403484"/>
+            <a:ext cx="3705245" cy="369332"/>
+          </a:xfrm>
+          <a:prstGeom prst="rect">
+            <a:avLst/>
+          </a:prstGeom>
+          <a:solidFill>
+            <a:srgbClr val="FFFF00"/>
+          </a:solidFill>
+        </p:spPr>
+        <p:txBody>
+          <a:bodyPr wrap="none" rtlCol="0">
+            <a:spAutoFit/>
+          </a:bodyPr>
+          <a:lstStyle/>
+          <a:p>
+            <a:r>
+              <a:rPr lang="en-US" b="1" dirty="0" smtClean="0">
+                <a:sym typeface="Symbol"/>
+              </a:rPr>
+              <a:t> updated by FIRST-VISIT state count</a:t>
+            </a:r>
+            <a:endParaRPr lang="en-US" b="1" dirty="0"/>
+          </a:p>
+        </p:txBody>
+      </p:sp>
+      <p:sp>
+        <p:nvSpPr>
+          <p:cNvPr id="7" name="TextBox 6"/>
+          <p:cNvSpPr txBox="1"/>
+          <p:nvPr/>
+        </p:nvSpPr>
+        <p:spPr>
+          <a:xfrm>
+            <a:off x="383847" y="6361583"/>
+            <a:ext cx="1965666" cy="307777"/>
+          </a:xfrm>
+          <a:prstGeom prst="rect">
+            <a:avLst/>
+          </a:prstGeom>
+          <a:noFill/>
+        </p:spPr>
+        <p:txBody>
+          <a:bodyPr wrap="none" rtlCol="0">
+            <a:spAutoFit/>
+          </a:bodyPr>
+          <a:lstStyle/>
+          <a:p>
+            <a:r>
+              <a:rPr lang="en-US" sz="1400" dirty="0" smtClean="0">
+                <a:sym typeface="Symbol"/>
+              </a:rPr>
+              <a:t>Ref: test_TD_lambda.py</a:t>
+            </a:r>
+            <a:endParaRPr lang="en-US" sz="1400" dirty="0"/>
+          </a:p>
+        </p:txBody>
+      </p:sp>
+      <p:grpSp>
+        <p:nvGrpSpPr>
+          <p:cNvPr id="5" name="Group 4"/>
+          <p:cNvGrpSpPr/>
+          <p:nvPr/>
+        </p:nvGrpSpPr>
+        <p:grpSpPr>
+          <a:xfrm>
+            <a:off x="1403648" y="2852936"/>
+            <a:ext cx="6671122" cy="4001931"/>
+            <a:chOff x="1403648" y="2852936"/>
+            <a:chExt cx="6671122" cy="4001931"/>
+          </a:xfrm>
+        </p:grpSpPr>
+        <p:pic>
+          <p:nvPicPr>
+            <p:cNvPr id="3076" name="Picture 4"/>
+            <p:cNvPicPr>
+              <a:picLocks noChangeAspect="1" noChangeArrowheads="1"/>
+            </p:cNvPicPr>
+            <p:nvPr/>
+          </p:nvPicPr>
+          <p:blipFill>
+            <a:blip r:embed="rId4">
+              <a:extLst>
+                <a:ext uri="{28A0092B-C50C-407E-A947-70E740481C1C}">
+                  <a14:useLocalDpi xmlns:a14="http://schemas.microsoft.com/office/drawing/2010/main" val="0"/>
+                </a:ext>
+              </a:extLst>
+            </a:blip>
+            <a:srcRect/>
+            <a:stretch>
+              <a:fillRect/>
+            </a:stretch>
+          </p:blipFill>
+          <p:spPr bwMode="auto">
+            <a:xfrm>
+              <a:off x="2459738" y="3178217"/>
+              <a:ext cx="4133850" cy="3676650"/>
+            </a:xfrm>
+            <a:prstGeom prst="rect">
+              <a:avLst/>
+            </a:prstGeom>
+            <a:noFill/>
+            <a:ln>
+              <a:noFill/>
+            </a:ln>
+            <a:extLst>
+              <a:ext uri="{909E8E84-426E-40DD-AFC4-6F175D3DCCD1}">
+                <a14:hiddenFill xmlns:a14="http://schemas.microsoft.com/office/drawing/2010/main">
+                  <a:solidFill>
+                    <a:schemeClr val="accent1"/>
+                  </a:solidFill>
+                </a14:hiddenFill>
+              </a:ext>
+              <a:ext uri="{91240B29-F687-4F45-9708-019B960494DF}">
+                <a14:hiddenLine xmlns:a14="http://schemas.microsoft.com/office/drawing/2010/main" w="9525">
+                  <a:solidFill>
+                    <a:schemeClr val="tx1"/>
+                  </a:solidFill>
+                  <a:miter lim="800000"/>
+                  <a:headEnd/>
+                  <a:tailEnd/>
+                </a14:hiddenLine>
+              </a:ext>
+            </a:extLst>
+          </p:spPr>
+        </p:pic>
+        <p:sp>
+          <p:nvSpPr>
+            <p:cNvPr id="4" name="TextBox 3"/>
+            <p:cNvSpPr txBox="1"/>
+            <p:nvPr/>
+          </p:nvSpPr>
+          <p:spPr>
+            <a:xfrm>
+              <a:off x="1403648" y="2852936"/>
+              <a:ext cx="6671122" cy="369332"/>
+            </a:xfrm>
+            <a:prstGeom prst="rect">
+              <a:avLst/>
+            </a:prstGeom>
+            <a:solidFill>
+              <a:schemeClr val="bg1"/>
+            </a:solidFill>
+            <a:ln>
+              <a:solidFill>
+                <a:schemeClr val="tx1"/>
+              </a:solidFill>
+            </a:ln>
+          </p:spPr>
+          <p:txBody>
+            <a:bodyPr wrap="none" rtlCol="0">
+              <a:spAutoFit/>
+            </a:bodyPr>
+            <a:lstStyle/>
+            <a:p>
+              <a:r>
+                <a:rPr lang="en-US" dirty="0" smtClean="0"/>
+                <a:t>Evolution of TD(0) with every-visit state count update </a:t>
+              </a:r>
+              <a:r>
+                <a:rPr lang="en-US" dirty="0" smtClean="0">
+                  <a:sym typeface="Wingdings" panose="05000000000000000000" pitchFamily="2" charset="2"/>
+                </a:rPr>
+                <a:t> VERY SLOW!</a:t>
+              </a:r>
+              <a:endParaRPr lang="en-US" dirty="0"/>
+            </a:p>
+          </p:txBody>
+        </p:sp>
+      </p:grpSp>
+    </p:spTree>
+    <p:extLst>
+      <p:ext uri="{BB962C8B-B14F-4D97-AF65-F5344CB8AC3E}">
+        <p14:creationId xmlns:p14="http://schemas.microsoft.com/office/powerpoint/2010/main" val="4141174193"/>
       </p:ext>
     </p:extLst>
   </p:cSld>

</xml_diff>